<commit_message>
Added trend_removal_func() to make _trend_removal public
</commit_message>
<xml_diff>
--- a/docs/FLAP_presentation_190905.pptx
+++ b/docs/FLAP_presentation_190905.pptx
@@ -5,7 +5,7 @@
     <p:sldMasterId id="2147483648" r:id="rId1"/>
   </p:sldMasterIdLst>
   <p:notesMasterIdLst>
-    <p:notesMasterId r:id="rId15"/>
+    <p:notesMasterId r:id="rId17"/>
   </p:notesMasterIdLst>
   <p:sldIdLst>
     <p:sldId id="317" r:id="rId2"/>
@@ -21,6 +21,8 @@
     <p:sldId id="335" r:id="rId12"/>
     <p:sldId id="338" r:id="rId13"/>
     <p:sldId id="339" r:id="rId14"/>
+    <p:sldId id="353" r:id="rId15"/>
+    <p:sldId id="354" r:id="rId16"/>
   </p:sldIdLst>
   <p:sldSz cx="9144000" cy="6858000" type="screen4x3"/>
   <p:notesSz cx="7315200" cy="9601200"/>
@@ -1235,6 +1237,196 @@
 </p:notes>
 </file>
 
+<file path=ppt/notesSlides/notesSlide14.xml><?xml version="1.0" encoding="utf-8"?>
+<p:notes xmlns:a="http://schemas.openxmlformats.org/drawingml/2006/main" xmlns:r="http://schemas.openxmlformats.org/officeDocument/2006/relationships" xmlns:p="http://schemas.openxmlformats.org/presentationml/2006/main">
+  <p:cSld>
+    <p:spTree>
+      <p:nvGrpSpPr>
+        <p:cNvPr id="1" name=""/>
+        <p:cNvGrpSpPr/>
+        <p:nvPr/>
+      </p:nvGrpSpPr>
+      <p:grpSpPr>
+        <a:xfrm>
+          <a:off x="0" y="0"/>
+          <a:ext cx="0" cy="0"/>
+          <a:chOff x="0" y="0"/>
+          <a:chExt cx="0" cy="0"/>
+        </a:xfrm>
+      </p:grpSpPr>
+      <p:sp>
+        <p:nvSpPr>
+          <p:cNvPr id="2" name="Diakép helye 1"/>
+          <p:cNvSpPr>
+            <a:spLocks noGrp="1" noRot="1" noChangeAspect="1"/>
+          </p:cNvSpPr>
+          <p:nvPr>
+            <p:ph type="sldImg"/>
+          </p:nvPr>
+        </p:nvSpPr>
+        <p:spPr>
+          <a:xfrm>
+            <a:off x="1257300" y="720725"/>
+            <a:ext cx="4800600" cy="3600450"/>
+          </a:xfrm>
+        </p:spPr>
+      </p:sp>
+      <p:sp>
+        <p:nvSpPr>
+          <p:cNvPr id="3" name="Jegyzetek helye 2"/>
+          <p:cNvSpPr>
+            <a:spLocks noGrp="1"/>
+          </p:cNvSpPr>
+          <p:nvPr>
+            <p:ph type="body" idx="1"/>
+          </p:nvPr>
+        </p:nvSpPr>
+        <p:spPr/>
+        <p:txBody>
+          <a:bodyPr/>
+          <a:lstStyle/>
+          <a:p>
+            <a:endParaRPr lang="hu-HU" dirty="0"/>
+          </a:p>
+        </p:txBody>
+      </p:sp>
+      <p:sp>
+        <p:nvSpPr>
+          <p:cNvPr id="4" name="Dia számának helye 3"/>
+          <p:cNvSpPr>
+            <a:spLocks noGrp="1"/>
+          </p:cNvSpPr>
+          <p:nvPr>
+            <p:ph type="sldNum" sz="quarter" idx="10"/>
+          </p:nvPr>
+        </p:nvSpPr>
+        <p:spPr/>
+        <p:txBody>
+          <a:bodyPr/>
+          <a:lstStyle/>
+          <a:p>
+            <a:pPr>
+              <a:defRPr/>
+            </a:pPr>
+            <a:fld id="{94B52368-4B6A-484D-825F-033CAD33C64A}" type="slidenum">
+              <a:rPr lang="hu-HU" smtClean="0"/>
+              <a:pPr>
+                <a:defRPr/>
+              </a:pPr>
+              <a:t>14</a:t>
+            </a:fld>
+            <a:endParaRPr lang="hu-HU"/>
+          </a:p>
+        </p:txBody>
+      </p:sp>
+    </p:spTree>
+    <p:extLst>
+      <p:ext uri="{BB962C8B-B14F-4D97-AF65-F5344CB8AC3E}">
+        <p14:creationId xmlns:p14="http://schemas.microsoft.com/office/powerpoint/2010/main" val="2165053064"/>
+      </p:ext>
+    </p:extLst>
+  </p:cSld>
+  <p:clrMapOvr>
+    <a:masterClrMapping/>
+  </p:clrMapOvr>
+</p:notes>
+</file>
+
+<file path=ppt/notesSlides/notesSlide15.xml><?xml version="1.0" encoding="utf-8"?>
+<p:notes xmlns:a="http://schemas.openxmlformats.org/drawingml/2006/main" xmlns:r="http://schemas.openxmlformats.org/officeDocument/2006/relationships" xmlns:p="http://schemas.openxmlformats.org/presentationml/2006/main">
+  <p:cSld>
+    <p:spTree>
+      <p:nvGrpSpPr>
+        <p:cNvPr id="1" name=""/>
+        <p:cNvGrpSpPr/>
+        <p:nvPr/>
+      </p:nvGrpSpPr>
+      <p:grpSpPr>
+        <a:xfrm>
+          <a:off x="0" y="0"/>
+          <a:ext cx="0" cy="0"/>
+          <a:chOff x="0" y="0"/>
+          <a:chExt cx="0" cy="0"/>
+        </a:xfrm>
+      </p:grpSpPr>
+      <p:sp>
+        <p:nvSpPr>
+          <p:cNvPr id="2" name="Diakép helye 1"/>
+          <p:cNvSpPr>
+            <a:spLocks noGrp="1" noRot="1" noChangeAspect="1"/>
+          </p:cNvSpPr>
+          <p:nvPr>
+            <p:ph type="sldImg"/>
+          </p:nvPr>
+        </p:nvSpPr>
+        <p:spPr>
+          <a:xfrm>
+            <a:off x="1257300" y="720725"/>
+            <a:ext cx="4800600" cy="3600450"/>
+          </a:xfrm>
+        </p:spPr>
+      </p:sp>
+      <p:sp>
+        <p:nvSpPr>
+          <p:cNvPr id="3" name="Jegyzetek helye 2"/>
+          <p:cNvSpPr>
+            <a:spLocks noGrp="1"/>
+          </p:cNvSpPr>
+          <p:nvPr>
+            <p:ph type="body" idx="1"/>
+          </p:nvPr>
+        </p:nvSpPr>
+        <p:spPr/>
+        <p:txBody>
+          <a:bodyPr/>
+          <a:lstStyle/>
+          <a:p>
+            <a:endParaRPr lang="hu-HU" dirty="0"/>
+          </a:p>
+        </p:txBody>
+      </p:sp>
+      <p:sp>
+        <p:nvSpPr>
+          <p:cNvPr id="4" name="Dia számának helye 3"/>
+          <p:cNvSpPr>
+            <a:spLocks noGrp="1"/>
+          </p:cNvSpPr>
+          <p:nvPr>
+            <p:ph type="sldNum" sz="quarter" idx="10"/>
+          </p:nvPr>
+        </p:nvSpPr>
+        <p:spPr/>
+        <p:txBody>
+          <a:bodyPr/>
+          <a:lstStyle/>
+          <a:p>
+            <a:pPr>
+              <a:defRPr/>
+            </a:pPr>
+            <a:fld id="{94B52368-4B6A-484D-825F-033CAD33C64A}" type="slidenum">
+              <a:rPr lang="hu-HU" smtClean="0"/>
+              <a:pPr>
+                <a:defRPr/>
+              </a:pPr>
+              <a:t>15</a:t>
+            </a:fld>
+            <a:endParaRPr lang="hu-HU"/>
+          </a:p>
+        </p:txBody>
+      </p:sp>
+    </p:spTree>
+    <p:extLst>
+      <p:ext uri="{BB962C8B-B14F-4D97-AF65-F5344CB8AC3E}">
+        <p14:creationId xmlns:p14="http://schemas.microsoft.com/office/powerpoint/2010/main" val="2334237661"/>
+      </p:ext>
+    </p:extLst>
+  </p:cSld>
+  <p:clrMapOvr>
+    <a:masterClrMapping/>
+  </p:clrMapOvr>
+</p:notes>
+</file>
+
 <file path=ppt/notesSlides/notesSlide2.xml><?xml version="1.0" encoding="utf-8"?>
 <p:notes xmlns:a="http://schemas.openxmlformats.org/drawingml/2006/main" xmlns:r="http://schemas.openxmlformats.org/officeDocument/2006/relationships" xmlns:p="http://schemas.openxmlformats.org/presentationml/2006/main">
   <p:cSld>
@@ -2795,15 +2987,7 @@
                   <a:schemeClr val="tx1"/>
                 </a:solidFill>
               </a:rPr>
-              <a:t>FLAP   </a:t>
-            </a:r>
-            <a:r>
-              <a:rPr lang="en-US" sz="900" baseline="0" smtClean="0">
-                <a:solidFill>
-                  <a:schemeClr val="tx1"/>
-                </a:solidFill>
-              </a:rPr>
-              <a:t>  2019.09.05                                                                                                          </a:t>
+              <a:t>FLAP     2019.09.05                                                                                                          </a:t>
             </a:r>
             <a:r>
               <a:rPr lang="hu-HU" sz="900" smtClean="0">
@@ -5523,7 +5707,19 @@
               <a:rPr lang="en-US" smtClean="0">
                 <a:latin typeface="+mj-lt"/>
               </a:rPr>
-              <a:t>lice_data method/function can do two things:</a:t>
+              <a:t>lice_data method/function can </a:t>
+            </a:r>
+            <a:r>
+              <a:rPr lang="en-US" smtClean="0">
+                <a:latin typeface="+mj-lt"/>
+              </a:rPr>
+              <a:t>do multiple </a:t>
+            </a:r>
+            <a:r>
+              <a:rPr lang="en-US" smtClean="0">
+                <a:latin typeface="+mj-lt"/>
+              </a:rPr>
+              <a:t>things:</a:t>
             </a:r>
           </a:p>
           <a:p>
@@ -5547,23 +5743,54 @@
               <a:rPr lang="en-US" smtClean="0">
                 <a:latin typeface="+mj-lt"/>
               </a:rPr>
-              <a:t>Convert part of the data to a single value (Mean, Sum, Min, Max)</a:t>
-            </a:r>
-          </a:p>
-          <a:p>
+              <a:t>Convert part of the data to a single value (Mean, Sum, Min, Max</a:t>
+            </a:r>
+            <a:r>
+              <a:rPr lang="en-US" smtClean="0">
+                <a:latin typeface="+mj-lt"/>
+              </a:rPr>
+              <a:t>)</a:t>
+            </a:r>
+          </a:p>
+          <a:p>
+            <a:pPr marL="285750" indent="-285750">
+              <a:buFont typeface="Arial" panose="020B0604020202020204" pitchFamily="34" charset="0"/>
+              <a:buChar char="•"/>
+            </a:pPr>
+            <a:r>
+              <a:rPr lang="en-US">
+                <a:latin typeface="+mj-lt"/>
+              </a:rPr>
+              <a:t>C</a:t>
+            </a:r>
+            <a:r>
+              <a:rPr lang="en-US" smtClean="0">
+                <a:latin typeface="+mj-lt"/>
+              </a:rPr>
+              <a:t>ut out intervals and arrange them in a new dimension (multi-slice)</a:t>
+            </a:r>
             <a:endParaRPr lang="en-US" smtClean="0">
               <a:latin typeface="+mj-lt"/>
             </a:endParaRPr>
           </a:p>
           <a:p>
-            <a:r>
-              <a:rPr lang="en-US" smtClean="0">
-                <a:latin typeface="+mj-lt"/>
-              </a:rPr>
-              <a:t>Slicing is done along coordinates.</a:t>
-            </a:r>
-          </a:p>
-          <a:p>
+            <a:endParaRPr lang="en-US" smtClean="0">
+              <a:latin typeface="+mj-lt"/>
+            </a:endParaRPr>
+          </a:p>
+          <a:p>
+            <a:r>
+              <a:rPr lang="en-US" smtClean="0">
+                <a:latin typeface="+mj-lt"/>
+              </a:rPr>
+              <a:t>Slicing is done along coordinates</a:t>
+            </a:r>
+            <a:r>
+              <a:rPr lang="en-US" smtClean="0">
+                <a:latin typeface="+mj-lt"/>
+              </a:rPr>
+              <a:t>.</a:t>
+            </a:r>
             <a:endParaRPr lang="en-US" smtClean="0">
               <a:latin typeface="+mj-lt"/>
             </a:endParaRPr>
@@ -6729,6 +6956,814 @@
     <p:extLst>
       <p:ext uri="{BB962C8B-B14F-4D97-AF65-F5344CB8AC3E}">
         <p14:creationId xmlns:p14="http://schemas.microsoft.com/office/powerpoint/2010/main" val="558488198"/>
+      </p:ext>
+    </p:extLst>
+  </p:cSld>
+  <p:clrMapOvr>
+    <a:masterClrMapping/>
+  </p:clrMapOvr>
+  <p:timing>
+    <p:tnLst>
+      <p:par>
+        <p:cTn id="1" dur="indefinite" restart="never" nodeType="tmRoot"/>
+      </p:par>
+    </p:tnLst>
+  </p:timing>
+</p:sld>
+</file>
+
+<file path=ppt/slides/slide14.xml><?xml version="1.0" encoding="utf-8"?>
+<p:sld xmlns:a="http://schemas.openxmlformats.org/drawingml/2006/main" xmlns:r="http://schemas.openxmlformats.org/officeDocument/2006/relationships" xmlns:p="http://schemas.openxmlformats.org/presentationml/2006/main">
+  <p:cSld>
+    <p:spTree>
+      <p:nvGrpSpPr>
+        <p:cNvPr id="1" name=""/>
+        <p:cNvGrpSpPr/>
+        <p:nvPr/>
+      </p:nvGrpSpPr>
+      <p:grpSpPr>
+        <a:xfrm>
+          <a:off x="0" y="0"/>
+          <a:ext cx="0" cy="0"/>
+          <a:chOff x="0" y="0"/>
+          <a:chExt cx="0" cy="0"/>
+        </a:xfrm>
+      </p:grpSpPr>
+      <p:sp>
+        <p:nvSpPr>
+          <p:cNvPr id="13" name="Téglalap 4"/>
+          <p:cNvSpPr/>
+          <p:nvPr/>
+        </p:nvSpPr>
+        <p:spPr bwMode="auto">
+          <a:xfrm>
+            <a:off x="1638311" y="59543"/>
+            <a:ext cx="5475514" cy="308179"/>
+          </a:xfrm>
+          <a:prstGeom prst="rect">
+            <a:avLst/>
+          </a:prstGeom>
+          <a:noFill/>
+          <a:ln>
+            <a:noFill/>
+          </a:ln>
+          <a:effectLst/>
+        </p:spPr>
+        <p:style>
+          <a:lnRef idx="2">
+            <a:schemeClr val="accent1">
+              <a:shade val="50000"/>
+            </a:schemeClr>
+          </a:lnRef>
+          <a:fillRef idx="1">
+            <a:schemeClr val="accent1"/>
+          </a:fillRef>
+          <a:effectRef idx="0">
+            <a:schemeClr val="accent1"/>
+          </a:effectRef>
+          <a:fontRef idx="minor">
+            <a:schemeClr val="lt1"/>
+          </a:fontRef>
+        </p:style>
+        <p:txBody>
+          <a:bodyPr anchor="ctr"/>
+          <a:lstStyle/>
+          <a:p>
+            <a:pPr algn="ctr">
+              <a:defRPr/>
+            </a:pPr>
+            <a:r>
+              <a:rPr lang="en-US" sz="2000" smtClean="0">
+                <a:solidFill>
+                  <a:schemeClr val="tx1"/>
+                </a:solidFill>
+                <a:ea typeface="Arial Unicode MS" pitchFamily="34" charset="-128"/>
+                <a:cs typeface="Arial Unicode MS" pitchFamily="34" charset="-128"/>
+              </a:rPr>
+              <a:t>Data processing methods</a:t>
+            </a:r>
+            <a:endParaRPr lang="en-US" sz="2000" dirty="0">
+              <a:solidFill>
+                <a:schemeClr val="tx1"/>
+              </a:solidFill>
+              <a:ea typeface="Arial Unicode MS" pitchFamily="34" charset="-128"/>
+              <a:cs typeface="Arial Unicode MS" pitchFamily="34" charset="-128"/>
+            </a:endParaRPr>
+          </a:p>
+        </p:txBody>
+      </p:sp>
+      <p:cxnSp>
+        <p:nvCxnSpPr>
+          <p:cNvPr id="8" name="Egyenes összekötő 7"/>
+          <p:cNvCxnSpPr/>
+          <p:nvPr/>
+        </p:nvCxnSpPr>
+        <p:spPr>
+          <a:xfrm>
+            <a:off x="1924526" y="1487329"/>
+            <a:ext cx="0" cy="0"/>
+          </a:xfrm>
+          <a:prstGeom prst="line">
+            <a:avLst/>
+          </a:prstGeom>
+        </p:spPr>
+        <p:style>
+          <a:lnRef idx="1">
+            <a:schemeClr val="accent1"/>
+          </a:lnRef>
+          <a:fillRef idx="0">
+            <a:schemeClr val="accent1"/>
+          </a:fillRef>
+          <a:effectRef idx="0">
+            <a:schemeClr val="accent1"/>
+          </a:effectRef>
+          <a:fontRef idx="minor">
+            <a:schemeClr val="tx1"/>
+          </a:fontRef>
+        </p:style>
+      </p:cxnSp>
+      <p:sp>
+        <p:nvSpPr>
+          <p:cNvPr id="10" name="Szövegdoboz 9"/>
+          <p:cNvSpPr txBox="1"/>
+          <p:nvPr/>
+        </p:nvSpPr>
+        <p:spPr>
+          <a:xfrm>
+            <a:off x="175313" y="565661"/>
+            <a:ext cx="9044049" cy="5909310"/>
+          </a:xfrm>
+          <a:prstGeom prst="rect">
+            <a:avLst/>
+          </a:prstGeom>
+          <a:noFill/>
+        </p:spPr>
+        <p:txBody>
+          <a:bodyPr wrap="square" rtlCol="0">
+            <a:spAutoFit/>
+          </a:bodyPr>
+          <a:lstStyle/>
+          <a:p>
+            <a:r>
+              <a:rPr lang="en-US" smtClean="0">
+                <a:latin typeface="+mj-lt"/>
+                <a:sym typeface="Wingdings" panose="05000000000000000000" pitchFamily="2" charset="2"/>
+              </a:rPr>
+              <a:t>All processing methods operate on data objects and produce data objects as output.</a:t>
+            </a:r>
+          </a:p>
+          <a:p>
+            <a:r>
+              <a:rPr lang="en-US" smtClean="0">
+                <a:latin typeface="+mj-lt"/>
+                <a:sym typeface="Wingdings" panose="05000000000000000000" pitchFamily="2" charset="2"/>
+              </a:rPr>
+              <a:t>It is possible to limit processing to intervals:</a:t>
+            </a:r>
+          </a:p>
+          <a:p>
+            <a:endParaRPr lang="en-US">
+              <a:latin typeface="+mj-lt"/>
+              <a:sym typeface="Wingdings" panose="05000000000000000000" pitchFamily="2" charset="2"/>
+            </a:endParaRPr>
+          </a:p>
+          <a:p>
+            <a:r>
+              <a:rPr lang="en-US" smtClean="0">
+                <a:solidFill>
+                  <a:srgbClr val="3333FF"/>
+                </a:solidFill>
+                <a:latin typeface="+mj-lt"/>
+                <a:sym typeface="Wingdings" panose="05000000000000000000" pitchFamily="2" charset="2"/>
+              </a:rPr>
+              <a:t>filter_data: </a:t>
+            </a:r>
+            <a:r>
+              <a:rPr lang="en-US" smtClean="0">
+                <a:latin typeface="+mj-lt"/>
+                <a:sym typeface="Wingdings" panose="05000000000000000000" pitchFamily="2" charset="2"/>
+              </a:rPr>
+              <a:t>Various scipy filters can be used along one coordinate</a:t>
+            </a:r>
+          </a:p>
+          <a:p>
+            <a:endParaRPr lang="en-US" smtClean="0">
+              <a:latin typeface="+mj-lt"/>
+              <a:sym typeface="Wingdings" panose="05000000000000000000" pitchFamily="2" charset="2"/>
+            </a:endParaRPr>
+          </a:p>
+          <a:p>
+            <a:r>
+              <a:rPr lang="en-US" smtClean="0">
+                <a:solidFill>
+                  <a:srgbClr val="3333FF"/>
+                </a:solidFill>
+                <a:latin typeface="+mj-lt"/>
+                <a:sym typeface="Wingdings" panose="05000000000000000000" pitchFamily="2" charset="2"/>
+              </a:rPr>
+              <a:t>apsd:</a:t>
+            </a:r>
+            <a:r>
+              <a:rPr lang="en-US" smtClean="0">
+                <a:latin typeface="+mj-lt"/>
+                <a:sym typeface="Wingdings" panose="05000000000000000000" pitchFamily="2" charset="2"/>
+              </a:rPr>
+              <a:t> Auto Power Spectral Density along a coordinate</a:t>
+            </a:r>
+          </a:p>
+          <a:p>
+            <a:r>
+              <a:rPr lang="en-US">
+                <a:latin typeface="+mj-lt"/>
+                <a:sym typeface="Wingdings" panose="05000000000000000000" pitchFamily="2" charset="2"/>
+              </a:rPr>
+              <a:t> </a:t>
+            </a:r>
+            <a:r>
+              <a:rPr lang="en-US" smtClean="0">
+                <a:latin typeface="+mj-lt"/>
+                <a:sym typeface="Wingdings" panose="05000000000000000000" pitchFamily="2" charset="2"/>
+              </a:rPr>
+              <a:t>        (e.g. converts Time coordinate to Frequency)</a:t>
+            </a:r>
+            <a:endParaRPr lang="en-US" smtClean="0">
+              <a:latin typeface="+mj-lt"/>
+              <a:sym typeface="Wingdings" panose="05000000000000000000" pitchFamily="2" charset="2"/>
+            </a:endParaRPr>
+          </a:p>
+          <a:p>
+            <a:endParaRPr lang="en-US" smtClean="0">
+              <a:latin typeface="+mj-lt"/>
+              <a:sym typeface="Wingdings" panose="05000000000000000000" pitchFamily="2" charset="2"/>
+            </a:endParaRPr>
+          </a:p>
+          <a:p>
+            <a:r>
+              <a:rPr lang="en-US" smtClean="0">
+                <a:solidFill>
+                  <a:srgbClr val="3333FF"/>
+                </a:solidFill>
+                <a:latin typeface="+mj-lt"/>
+                <a:sym typeface="Wingdings" panose="05000000000000000000" pitchFamily="2" charset="2"/>
+              </a:rPr>
+              <a:t>cpsd: </a:t>
+            </a:r>
+            <a:r>
+              <a:rPr lang="en-US" smtClean="0">
+                <a:latin typeface="+mj-lt"/>
+                <a:sym typeface="Wingdings" panose="05000000000000000000" pitchFamily="2" charset="2"/>
+              </a:rPr>
+              <a:t>Cross Power Spectral Density between all signals in two data objects</a:t>
+            </a:r>
+          </a:p>
+          <a:p>
+            <a:r>
+              <a:rPr lang="en-US">
+                <a:latin typeface="+mj-lt"/>
+                <a:sym typeface="Wingdings" panose="05000000000000000000" pitchFamily="2" charset="2"/>
+              </a:rPr>
+              <a:t> </a:t>
+            </a:r>
+            <a:r>
+              <a:rPr lang="en-US" smtClean="0">
+                <a:latin typeface="+mj-lt"/>
+                <a:sym typeface="Wingdings" panose="05000000000000000000" pitchFamily="2" charset="2"/>
+              </a:rPr>
+              <a:t>        </a:t>
+            </a:r>
+            <a:r>
+              <a:rPr lang="en-US">
+                <a:sym typeface="Wingdings" panose="05000000000000000000" pitchFamily="2" charset="2"/>
+              </a:rPr>
+              <a:t>(e.g. converts Time coordinate to </a:t>
+            </a:r>
+            <a:r>
+              <a:rPr lang="en-US">
+                <a:sym typeface="Wingdings" panose="05000000000000000000" pitchFamily="2" charset="2"/>
+              </a:rPr>
+              <a:t>Frequency</a:t>
+            </a:r>
+            <a:r>
+              <a:rPr lang="en-US" smtClean="0">
+                <a:sym typeface="Wingdings" panose="05000000000000000000" pitchFamily="2" charset="2"/>
+              </a:rPr>
+              <a:t>)</a:t>
+            </a:r>
+            <a:endParaRPr lang="en-US" smtClean="0">
+              <a:latin typeface="+mj-lt"/>
+              <a:sym typeface="Wingdings" panose="05000000000000000000" pitchFamily="2" charset="2"/>
+            </a:endParaRPr>
+          </a:p>
+          <a:p>
+            <a:endParaRPr lang="en-US" smtClean="0">
+              <a:latin typeface="+mj-lt"/>
+              <a:sym typeface="Wingdings" panose="05000000000000000000" pitchFamily="2" charset="2"/>
+            </a:endParaRPr>
+          </a:p>
+          <a:p>
+            <a:r>
+              <a:rPr lang="en-US" smtClean="0">
+                <a:solidFill>
+                  <a:srgbClr val="3333FF"/>
+                </a:solidFill>
+                <a:latin typeface="+mj-lt"/>
+                <a:sym typeface="Wingdings" panose="05000000000000000000" pitchFamily="2" charset="2"/>
+              </a:rPr>
+              <a:t>ccf: </a:t>
+            </a:r>
+            <a:r>
+              <a:rPr lang="en-US" smtClean="0">
+                <a:latin typeface="+mj-lt"/>
+                <a:sym typeface="Wingdings" panose="05000000000000000000" pitchFamily="2" charset="2"/>
+              </a:rPr>
+              <a:t>Cross Correlation Function between all signals in two data objects</a:t>
+            </a:r>
+          </a:p>
+          <a:p>
+            <a:r>
+              <a:rPr lang="en-US">
+                <a:latin typeface="+mj-lt"/>
+                <a:sym typeface="Wingdings" panose="05000000000000000000" pitchFamily="2" charset="2"/>
+              </a:rPr>
+              <a:t> </a:t>
+            </a:r>
+            <a:r>
+              <a:rPr lang="en-US" smtClean="0">
+                <a:latin typeface="+mj-lt"/>
+                <a:sym typeface="Wingdings" panose="05000000000000000000" pitchFamily="2" charset="2"/>
+              </a:rPr>
+              <a:t>      Also multi-dimensional CCF</a:t>
+            </a:r>
+          </a:p>
+          <a:p>
+            <a:r>
+              <a:rPr lang="en-US">
+                <a:latin typeface="+mj-lt"/>
+                <a:sym typeface="Wingdings" panose="05000000000000000000" pitchFamily="2" charset="2"/>
+              </a:rPr>
+              <a:t> </a:t>
+            </a:r>
+            <a:r>
+              <a:rPr lang="en-US" smtClean="0">
+                <a:latin typeface="+mj-lt"/>
+                <a:sym typeface="Wingdings" panose="05000000000000000000" pitchFamily="2" charset="2"/>
+              </a:rPr>
+              <a:t>      </a:t>
+            </a:r>
+            <a:r>
+              <a:rPr lang="en-US">
+                <a:sym typeface="Wingdings" panose="05000000000000000000" pitchFamily="2" charset="2"/>
+              </a:rPr>
+              <a:t>(e.g. converts Time coordinate </a:t>
+            </a:r>
+            <a:r>
+              <a:rPr lang="en-US">
+                <a:sym typeface="Wingdings" panose="05000000000000000000" pitchFamily="2" charset="2"/>
+              </a:rPr>
+              <a:t>to </a:t>
+            </a:r>
+            <a:r>
+              <a:rPr lang="en-US" smtClean="0">
+                <a:sym typeface="Wingdings" panose="05000000000000000000" pitchFamily="2" charset="2"/>
+              </a:rPr>
+              <a:t>Time lag)</a:t>
+            </a:r>
+            <a:endParaRPr lang="en-US" smtClean="0">
+              <a:latin typeface="+mj-lt"/>
+              <a:sym typeface="Wingdings" panose="05000000000000000000" pitchFamily="2" charset="2"/>
+            </a:endParaRPr>
+          </a:p>
+          <a:p>
+            <a:endParaRPr lang="en-US" smtClean="0">
+              <a:latin typeface="+mj-lt"/>
+              <a:sym typeface="Wingdings" panose="05000000000000000000" pitchFamily="2" charset="2"/>
+            </a:endParaRPr>
+          </a:p>
+          <a:p>
+            <a:r>
+              <a:rPr lang="en-US" smtClean="0">
+                <a:solidFill>
+                  <a:srgbClr val="3333FF"/>
+                </a:solidFill>
+                <a:latin typeface="+mj-lt"/>
+                <a:sym typeface="Wingdings" panose="05000000000000000000" pitchFamily="2" charset="2"/>
+              </a:rPr>
+              <a:t>select_intervals:</a:t>
+            </a:r>
+            <a:r>
+              <a:rPr lang="en-US" smtClean="0">
+                <a:latin typeface="+mj-lt"/>
+                <a:sym typeface="Wingdings" panose="05000000000000000000" pitchFamily="2" charset="2"/>
+              </a:rPr>
+              <a:t> Select intervals in a coordinate either by mouse click or on condition</a:t>
+            </a:r>
+          </a:p>
+          <a:p>
+            <a:r>
+              <a:rPr lang="en-US">
+                <a:latin typeface="+mj-lt"/>
+                <a:sym typeface="Wingdings" panose="05000000000000000000" pitchFamily="2" charset="2"/>
+              </a:rPr>
+              <a:t> </a:t>
+            </a:r>
+            <a:r>
+              <a:rPr lang="en-US" smtClean="0">
+                <a:latin typeface="+mj-lt"/>
+                <a:sym typeface="Wingdings" panose="05000000000000000000" pitchFamily="2" charset="2"/>
+              </a:rPr>
+              <a:t>       Output is data object where intervals are described by data and error.</a:t>
+            </a:r>
+          </a:p>
+          <a:p>
+            <a:r>
+              <a:rPr lang="en-US">
+                <a:latin typeface="+mj-lt"/>
+                <a:sym typeface="Wingdings" panose="05000000000000000000" pitchFamily="2" charset="2"/>
+              </a:rPr>
+              <a:t> </a:t>
+            </a:r>
+            <a:r>
+              <a:rPr lang="en-US" smtClean="0">
+                <a:latin typeface="+mj-lt"/>
+                <a:sym typeface="Wingdings" panose="05000000000000000000" pitchFamily="2" charset="2"/>
+              </a:rPr>
+              <a:t>       The output data object can be used in slice_data  conditional averaging</a:t>
+            </a:r>
+            <a:endParaRPr lang="en-US" smtClean="0">
+              <a:latin typeface="+mj-lt"/>
+              <a:sym typeface="Wingdings" panose="05000000000000000000" pitchFamily="2" charset="2"/>
+            </a:endParaRPr>
+          </a:p>
+          <a:p>
+            <a:endParaRPr lang="en-US" smtClean="0">
+              <a:latin typeface="+mj-lt"/>
+            </a:endParaRPr>
+          </a:p>
+          <a:p>
+            <a:r>
+              <a:rPr lang="en-US" smtClean="0">
+                <a:solidFill>
+                  <a:srgbClr val="3333FF"/>
+                </a:solidFill>
+                <a:latin typeface="+mj-lt"/>
+              </a:rPr>
+              <a:t>arithmetic:</a:t>
+            </a:r>
+            <a:r>
+              <a:rPr lang="en-US" smtClean="0">
+                <a:latin typeface="+mj-lt"/>
+              </a:rPr>
+              <a:t> +,-,* is implemented between data objects with identical shape and scalars</a:t>
+            </a:r>
+          </a:p>
+          <a:p>
+            <a:r>
+              <a:rPr lang="en-US">
+                <a:latin typeface="+mj-lt"/>
+              </a:rPr>
+              <a:t> </a:t>
+            </a:r>
+            <a:r>
+              <a:rPr lang="en-US" smtClean="0">
+                <a:latin typeface="+mj-lt"/>
+              </a:rPr>
+              <a:t>                 broadcasting to be implemented soon</a:t>
+            </a:r>
+            <a:r>
+              <a:rPr lang="en-US" smtClean="0">
+                <a:latin typeface="+mj-lt"/>
+              </a:rPr>
+              <a:t> </a:t>
+            </a:r>
+            <a:endParaRPr lang="en-US" smtClean="0">
+              <a:latin typeface="+mj-lt"/>
+            </a:endParaRPr>
+          </a:p>
+        </p:txBody>
+      </p:sp>
+    </p:spTree>
+    <p:extLst>
+      <p:ext uri="{BB962C8B-B14F-4D97-AF65-F5344CB8AC3E}">
+        <p14:creationId xmlns:p14="http://schemas.microsoft.com/office/powerpoint/2010/main" val="2770483574"/>
+      </p:ext>
+    </p:extLst>
+  </p:cSld>
+  <p:clrMapOvr>
+    <a:masterClrMapping/>
+  </p:clrMapOvr>
+  <p:timing>
+    <p:tnLst>
+      <p:par>
+        <p:cTn id="1" dur="indefinite" restart="never" nodeType="tmRoot"/>
+      </p:par>
+    </p:tnLst>
+  </p:timing>
+</p:sld>
+</file>
+
+<file path=ppt/slides/slide15.xml><?xml version="1.0" encoding="utf-8"?>
+<p:sld xmlns:a="http://schemas.openxmlformats.org/drawingml/2006/main" xmlns:r="http://schemas.openxmlformats.org/officeDocument/2006/relationships" xmlns:p="http://schemas.openxmlformats.org/presentationml/2006/main">
+  <p:cSld>
+    <p:spTree>
+      <p:nvGrpSpPr>
+        <p:cNvPr id="1" name=""/>
+        <p:cNvGrpSpPr/>
+        <p:nvPr/>
+      </p:nvGrpSpPr>
+      <p:grpSpPr>
+        <a:xfrm>
+          <a:off x="0" y="0"/>
+          <a:ext cx="0" cy="0"/>
+          <a:chOff x="0" y="0"/>
+          <a:chExt cx="0" cy="0"/>
+        </a:xfrm>
+      </p:grpSpPr>
+      <p:sp>
+        <p:nvSpPr>
+          <p:cNvPr id="13" name="Téglalap 4"/>
+          <p:cNvSpPr/>
+          <p:nvPr/>
+        </p:nvSpPr>
+        <p:spPr bwMode="auto">
+          <a:xfrm>
+            <a:off x="1638311" y="59543"/>
+            <a:ext cx="5475514" cy="308179"/>
+          </a:xfrm>
+          <a:prstGeom prst="rect">
+            <a:avLst/>
+          </a:prstGeom>
+          <a:noFill/>
+          <a:ln>
+            <a:noFill/>
+          </a:ln>
+          <a:effectLst/>
+        </p:spPr>
+        <p:style>
+          <a:lnRef idx="2">
+            <a:schemeClr val="accent1">
+              <a:shade val="50000"/>
+            </a:schemeClr>
+          </a:lnRef>
+          <a:fillRef idx="1">
+            <a:schemeClr val="accent1"/>
+          </a:fillRef>
+          <a:effectRef idx="0">
+            <a:schemeClr val="accent1"/>
+          </a:effectRef>
+          <a:fontRef idx="minor">
+            <a:schemeClr val="lt1"/>
+          </a:fontRef>
+        </p:style>
+        <p:txBody>
+          <a:bodyPr anchor="ctr"/>
+          <a:lstStyle/>
+          <a:p>
+            <a:pPr algn="ctr">
+              <a:defRPr/>
+            </a:pPr>
+            <a:r>
+              <a:rPr lang="en-US" sz="2000" smtClean="0">
+                <a:solidFill>
+                  <a:schemeClr val="tx1"/>
+                </a:solidFill>
+                <a:ea typeface="Arial Unicode MS" pitchFamily="34" charset="-128"/>
+                <a:cs typeface="Arial Unicode MS" pitchFamily="34" charset="-128"/>
+              </a:rPr>
+              <a:t>Plotting</a:t>
+            </a:r>
+            <a:endParaRPr lang="en-US" sz="2000" dirty="0">
+              <a:solidFill>
+                <a:schemeClr val="tx1"/>
+              </a:solidFill>
+              <a:ea typeface="Arial Unicode MS" pitchFamily="34" charset="-128"/>
+              <a:cs typeface="Arial Unicode MS" pitchFamily="34" charset="-128"/>
+            </a:endParaRPr>
+          </a:p>
+        </p:txBody>
+      </p:sp>
+      <p:cxnSp>
+        <p:nvCxnSpPr>
+          <p:cNvPr id="8" name="Egyenes összekötő 7"/>
+          <p:cNvCxnSpPr/>
+          <p:nvPr/>
+        </p:nvCxnSpPr>
+        <p:spPr>
+          <a:xfrm>
+            <a:off x="1924526" y="1487329"/>
+            <a:ext cx="0" cy="0"/>
+          </a:xfrm>
+          <a:prstGeom prst="line">
+            <a:avLst/>
+          </a:prstGeom>
+        </p:spPr>
+        <p:style>
+          <a:lnRef idx="1">
+            <a:schemeClr val="accent1"/>
+          </a:lnRef>
+          <a:fillRef idx="0">
+            <a:schemeClr val="accent1"/>
+          </a:fillRef>
+          <a:effectRef idx="0">
+            <a:schemeClr val="accent1"/>
+          </a:effectRef>
+          <a:fontRef idx="minor">
+            <a:schemeClr val="tx1"/>
+          </a:fontRef>
+        </p:style>
+      </p:cxnSp>
+      <p:sp>
+        <p:nvSpPr>
+          <p:cNvPr id="10" name="Szövegdoboz 9"/>
+          <p:cNvSpPr txBox="1"/>
+          <p:nvPr/>
+        </p:nvSpPr>
+        <p:spPr>
+          <a:xfrm>
+            <a:off x="175313" y="565661"/>
+            <a:ext cx="9044049" cy="4108817"/>
+          </a:xfrm>
+          <a:prstGeom prst="rect">
+            <a:avLst/>
+          </a:prstGeom>
+          <a:noFill/>
+        </p:spPr>
+        <p:txBody>
+          <a:bodyPr wrap="square" rtlCol="0">
+            <a:spAutoFit/>
+          </a:bodyPr>
+          <a:lstStyle/>
+          <a:p>
+            <a:r>
+              <a:rPr lang="en-US" smtClean="0">
+                <a:solidFill>
+                  <a:srgbClr val="3333FF"/>
+                </a:solidFill>
+                <a:latin typeface="+mj-lt"/>
+              </a:rPr>
+              <a:t>flap.plot function </a:t>
+            </a:r>
+            <a:r>
+              <a:rPr lang="en-US" smtClean="0">
+                <a:latin typeface="+mj-lt"/>
+              </a:rPr>
+              <a:t>implements higher level plots on the basis on Matplotlib:</a:t>
+            </a:r>
+          </a:p>
+          <a:p>
+            <a:pPr marL="285750" indent="-285750">
+              <a:lnSpc>
+                <a:spcPct val="150000"/>
+              </a:lnSpc>
+              <a:buFont typeface="Arial" panose="020B0604020202020204" pitchFamily="34" charset="0"/>
+              <a:buChar char="•"/>
+            </a:pPr>
+            <a:r>
+              <a:rPr lang="en-US" smtClean="0">
+                <a:latin typeface="+mj-lt"/>
+              </a:rPr>
+              <a:t>Handles coordinates, errors, ... automatically</a:t>
+            </a:r>
+          </a:p>
+          <a:p>
+            <a:pPr marL="285750" indent="-285750">
+              <a:lnSpc>
+                <a:spcPct val="150000"/>
+              </a:lnSpc>
+              <a:buFont typeface="Arial" panose="020B0604020202020204" pitchFamily="34" charset="0"/>
+              <a:buChar char="•"/>
+            </a:pPr>
+            <a:r>
+              <a:rPr lang="en-US" smtClean="0">
+                <a:latin typeface="+mj-lt"/>
+              </a:rPr>
+              <a:t>Can plot data vs coordinates, coordinates vs coordinates, constant vs coordinate,</a:t>
+            </a:r>
+          </a:p>
+          <a:p>
+            <a:pPr>
+              <a:lnSpc>
+                <a:spcPct val="150000"/>
+              </a:lnSpc>
+            </a:pPr>
+            <a:r>
+              <a:rPr lang="en-US">
+                <a:latin typeface="+mj-lt"/>
+              </a:rPr>
+              <a:t> </a:t>
+            </a:r>
+            <a:r>
+              <a:rPr lang="en-US" smtClean="0">
+                <a:latin typeface="+mj-lt"/>
+              </a:rPr>
+              <a:t>    one data object vs another, ....</a:t>
+            </a:r>
+          </a:p>
+          <a:p>
+            <a:pPr marL="285750" indent="-285750">
+              <a:lnSpc>
+                <a:spcPct val="150000"/>
+              </a:lnSpc>
+              <a:buFont typeface="Arial" panose="020B0604020202020204" pitchFamily="34" charset="0"/>
+              <a:buChar char="•"/>
+            </a:pPr>
+            <a:r>
+              <a:rPr lang="en-US" smtClean="0">
+                <a:latin typeface="+mj-lt"/>
+              </a:rPr>
+              <a:t>Handles overplotting: as default prevents overplotting data with incompatible units</a:t>
+            </a:r>
+          </a:p>
+          <a:p>
+            <a:pPr>
+              <a:lnSpc>
+                <a:spcPct val="150000"/>
+              </a:lnSpc>
+            </a:pPr>
+            <a:r>
+              <a:rPr lang="en-US">
+                <a:latin typeface="+mj-lt"/>
+              </a:rPr>
+              <a:t> </a:t>
+            </a:r>
+            <a:r>
+              <a:rPr lang="en-US" smtClean="0">
+                <a:latin typeface="+mj-lt"/>
+              </a:rPr>
+              <a:t>    (can be overridden)</a:t>
+            </a:r>
+          </a:p>
+          <a:p>
+            <a:pPr marL="285750" indent="-285750">
+              <a:lnSpc>
+                <a:spcPct val="150000"/>
+              </a:lnSpc>
+              <a:buFont typeface="Arial" panose="020B0604020202020204" pitchFamily="34" charset="0"/>
+              <a:buChar char="•"/>
+            </a:pPr>
+            <a:r>
+              <a:rPr lang="en-US" smtClean="0">
+                <a:latin typeface="+mj-lt"/>
+              </a:rPr>
+              <a:t>Plot types as present: xy, multi xy, image, contour, anim-image, anim-contour</a:t>
+            </a:r>
+          </a:p>
+          <a:p>
+            <a:pPr marL="285750" indent="-285750">
+              <a:lnSpc>
+                <a:spcPct val="150000"/>
+              </a:lnSpc>
+              <a:buFont typeface="Arial" panose="020B0604020202020204" pitchFamily="34" charset="0"/>
+              <a:buChar char="•"/>
+            </a:pPr>
+            <a:r>
+              <a:rPr lang="en-US" smtClean="0">
+                <a:latin typeface="+mj-lt"/>
+              </a:rPr>
+              <a:t>Default plots: e.g. 3D data object plotted as anim-... </a:t>
+            </a:r>
+            <a:endParaRPr lang="en-US" smtClean="0">
+              <a:latin typeface="+mj-lt"/>
+            </a:endParaRPr>
+          </a:p>
+          <a:p>
+            <a:pPr marL="285750" indent="-285750">
+              <a:lnSpc>
+                <a:spcPct val="150000"/>
+              </a:lnSpc>
+              <a:buFont typeface="Arial" panose="020B0604020202020204" pitchFamily="34" charset="0"/>
+              <a:buChar char="•"/>
+            </a:pPr>
+            <a:r>
+              <a:rPr lang="en-US" smtClean="0">
+                <a:latin typeface="+mj-lt"/>
+              </a:rPr>
+              <a:t>Multiple part plots. (e.g. complex signal is plot as amplitude/phase or real/imaginary)</a:t>
+            </a:r>
+          </a:p>
+          <a:p>
+            <a:pPr marL="285750" indent="-285750">
+              <a:lnSpc>
+                <a:spcPct val="150000"/>
+              </a:lnSpc>
+              <a:buFont typeface="Arial" panose="020B0604020202020204" pitchFamily="34" charset="0"/>
+              <a:buChar char="•"/>
+            </a:pPr>
+            <a:r>
+              <a:rPr lang="en-US" smtClean="0">
+                <a:latin typeface="+mj-lt"/>
+              </a:rPr>
+              <a:t>Plot ID is returned: possible to overplot to any existing (even multi-part) plot.</a:t>
+            </a:r>
+            <a:endParaRPr lang="en-US" smtClean="0">
+              <a:latin typeface="+mj-lt"/>
+            </a:endParaRPr>
+          </a:p>
+        </p:txBody>
+      </p:sp>
+    </p:spTree>
+    <p:extLst>
+      <p:ext uri="{BB962C8B-B14F-4D97-AF65-F5344CB8AC3E}">
+        <p14:creationId xmlns:p14="http://schemas.microsoft.com/office/powerpoint/2010/main" val="2048413466"/>
       </p:ext>
     </p:extLst>
   </p:cSld>
@@ -7269,16 +8304,7 @@
                 </a:solidFill>
                 <a:latin typeface="+mj-lt"/>
               </a:rPr>
-              <a:t>Data </a:t>
-            </a:r>
-            <a:r>
-              <a:rPr lang="en-US" smtClean="0">
-                <a:solidFill>
-                  <a:srgbClr val="3333FF"/>
-                </a:solidFill>
-                <a:latin typeface="+mj-lt"/>
-              </a:rPr>
-              <a:t>fields:</a:t>
+              <a:t>Data fields:</a:t>
             </a:r>
           </a:p>
           <a:p>
@@ -7297,16 +8323,7 @@
                 </a:solidFill>
                 <a:latin typeface="+mj-lt"/>
               </a:rPr>
-              <a:t>data</a:t>
-            </a:r>
-            <a:r>
-              <a:rPr lang="en-US" smtClean="0">
-                <a:solidFill>
-                  <a:srgbClr val="3333FF"/>
-                </a:solidFill>
-                <a:latin typeface="+mj-lt"/>
-              </a:rPr>
-              <a:t>:  </a:t>
+              <a:t>data:  </a:t>
             </a:r>
             <a:r>
               <a:rPr lang="en-US" smtClean="0">
@@ -7320,13 +8337,7 @@
               <a:rPr lang="en-US" smtClean="0">
                 <a:latin typeface="+mj-lt"/>
               </a:rPr>
-              <a:t>  data_shape</a:t>
-            </a:r>
-            <a:r>
-              <a:rPr lang="en-US" smtClean="0">
-                <a:latin typeface="+mj-lt"/>
-              </a:rPr>
-              <a:t>: Data array shape (used if no data is present)</a:t>
+              <a:t>  data_shape: Data array shape (used if no data is present)</a:t>
             </a:r>
           </a:p>
           <a:p>
@@ -7428,15 +8439,7 @@
           <a:p>
             <a:r>
               <a:rPr lang="en-US"/>
-              <a:t>                    </a:t>
-            </a:r>
-            <a:r>
-              <a:rPr lang="en-US"/>
-              <a:t>Arbitrary number of coordinate values can be assigned to data </a:t>
-            </a:r>
-            <a:r>
-              <a:rPr lang="en-US"/>
-              <a:t>points</a:t>
+              <a:t>                    Arbitrary number of coordinate values can be assigned to data points</a:t>
             </a:r>
             <a:r>
               <a:rPr lang="en-US" smtClean="0"/>
@@ -7452,16 +8455,7 @@
                 </a:solidFill>
                 <a:latin typeface="+mj-lt"/>
               </a:rPr>
-              <a:t>exp_id</a:t>
-            </a:r>
-            <a:r>
-              <a:rPr lang="en-US" smtClean="0">
-                <a:solidFill>
-                  <a:srgbClr val="3333FF"/>
-                </a:solidFill>
-                <a:latin typeface="+mj-lt"/>
-              </a:rPr>
-              <a:t>:</a:t>
+              <a:t>exp_id:</a:t>
             </a:r>
             <a:r>
               <a:rPr lang="en-US" smtClean="0">
@@ -7524,7 +8518,6 @@
               <a:rPr lang="en-US" smtClean="0"/>
               <a:t>at present empty for future application</a:t>
             </a:r>
-            <a:endParaRPr lang="en-US" smtClean="0"/>
           </a:p>
           <a:p>
             <a:endParaRPr lang="hu-HU" smtClean="0">
@@ -7710,17 +8703,21 @@
                 </a:solidFill>
                 <a:latin typeface="+mj-lt"/>
               </a:rPr>
-              <a:t> data </a:t>
-            </a:r>
-            <a:r>
-              <a:rPr lang="en-US" smtClean="0">
-                <a:solidFill>
-                  <a:srgbClr val="3333FF"/>
-                </a:solidFill>
-                <a:latin typeface="+mj-lt"/>
-              </a:rPr>
-              <a:t>points in the data array.</a:t>
-            </a:r>
+              <a:t> data points in the data array.</a:t>
+            </a:r>
+          </a:p>
+          <a:p>
+            <a:r>
+              <a:rPr lang="en-US" smtClean="0">
+                <a:latin typeface="+mj-lt"/>
+              </a:rPr>
+              <a:t>Arbitrary number of coordinatates can be added to DataObject</a:t>
+            </a:r>
+            <a:endParaRPr lang="en-US">
+              <a:latin typeface="+mj-lt"/>
+            </a:endParaRPr>
+          </a:p>
+          <a:p>
             <a:endParaRPr lang="en-US" smtClean="0">
               <a:solidFill>
                 <a:srgbClr val="3333FF"/>
@@ -7729,17 +8726,6 @@
             </a:endParaRPr>
           </a:p>
           <a:p>
-            <a:r>
-              <a:rPr lang="en-US" smtClean="0">
-                <a:latin typeface="+mj-lt"/>
-              </a:rPr>
-              <a:t>Arbitrary number of coordinatates can be added to DataObject</a:t>
-            </a:r>
-            <a:endParaRPr lang="en-US">
-              <a:latin typeface="+mj-lt"/>
-            </a:endParaRPr>
-          </a:p>
-          <a:p>
             <a:endParaRPr lang="en-US" smtClean="0">
               <a:solidFill>
                 <a:srgbClr val="3333FF"/>
@@ -7748,14 +8734,6 @@
             </a:endParaRPr>
           </a:p>
           <a:p>
-            <a:endParaRPr lang="en-US" smtClean="0">
-              <a:solidFill>
-                <a:srgbClr val="3333FF"/>
-              </a:solidFill>
-              <a:latin typeface="+mj-lt"/>
-            </a:endParaRPr>
-          </a:p>
-          <a:p>
             <a:r>
               <a:rPr lang="en-US" smtClean="0">
                 <a:solidFill>
@@ -7783,17 +8761,8 @@
               <a:rPr lang="en-US" smtClean="0">
                 <a:latin typeface="+mj-lt"/>
               </a:rPr>
-              <a:t>Varies only along some </a:t>
-            </a:r>
-            <a:r>
-              <a:rPr lang="en-US" smtClean="0">
-                <a:latin typeface="+mj-lt"/>
-              </a:rPr>
-              <a:t>dimension(s)</a:t>
-            </a:r>
-            <a:endParaRPr lang="en-US" smtClean="0">
-              <a:latin typeface="+mj-lt"/>
-            </a:endParaRPr>
+              <a:t>Varies only along some dimension(s)</a:t>
+            </a:r>
           </a:p>
           <a:p>
             <a:pPr marL="285750" indent="-285750">
@@ -8900,9 +9869,6 @@
               </a:rPr>
               <a:t>Flap storage contents can be listed with flap.list_data_objects()</a:t>
             </a:r>
-            <a:endParaRPr lang="en-US" smtClean="0">
-              <a:latin typeface="+mj-lt"/>
-            </a:endParaRPr>
           </a:p>
           <a:p>
             <a:endParaRPr lang="en-US" smtClean="0">
@@ -9801,9 +10767,6 @@
               </a:rPr>
               <a:t> MSD+ for W7-X. Can use signal translation table, e.g:</a:t>
             </a:r>
-            <a:endParaRPr lang="en-US" smtClean="0">
-              <a:latin typeface="+mj-lt"/>
-            </a:endParaRPr>
           </a:p>
         </p:txBody>
       </p:sp>
@@ -9953,9 +10916,6 @@
               </a:rPr>
               <a:t> General APDCAM access</a:t>
             </a:r>
-            <a:endParaRPr lang="en-US" smtClean="0">
-              <a:latin typeface="+mj-lt"/>
-            </a:endParaRPr>
           </a:p>
         </p:txBody>
       </p:sp>

</xml_diff>

<commit_message>
Small bugfix in trend removal
</commit_message>
<xml_diff>
--- a/docs/FLAP_presentation_190905.pptx
+++ b/docs/FLAP_presentation_190905.pptx
@@ -5,7 +5,7 @@
     <p:sldMasterId id="2147483648" r:id="rId1"/>
   </p:sldMasterIdLst>
   <p:notesMasterIdLst>
-    <p:notesMasterId r:id="rId17"/>
+    <p:notesMasterId r:id="rId20"/>
   </p:notesMasterIdLst>
   <p:sldIdLst>
     <p:sldId id="317" r:id="rId2"/>
@@ -23,6 +23,9 @@
     <p:sldId id="339" r:id="rId14"/>
     <p:sldId id="353" r:id="rId15"/>
     <p:sldId id="354" r:id="rId16"/>
+    <p:sldId id="355" r:id="rId17"/>
+    <p:sldId id="356" r:id="rId18"/>
+    <p:sldId id="357" r:id="rId19"/>
   </p:sldIdLst>
   <p:sldSz cx="9144000" cy="6858000" type="screen4x3"/>
   <p:notesSz cx="7315200" cy="9601200"/>
@@ -1418,6 +1421,291 @@
     <p:extLst>
       <p:ext uri="{BB962C8B-B14F-4D97-AF65-F5344CB8AC3E}">
         <p14:creationId xmlns:p14="http://schemas.microsoft.com/office/powerpoint/2010/main" val="2334237661"/>
+      </p:ext>
+    </p:extLst>
+  </p:cSld>
+  <p:clrMapOvr>
+    <a:masterClrMapping/>
+  </p:clrMapOvr>
+</p:notes>
+</file>
+
+<file path=ppt/notesSlides/notesSlide16.xml><?xml version="1.0" encoding="utf-8"?>
+<p:notes xmlns:a="http://schemas.openxmlformats.org/drawingml/2006/main" xmlns:r="http://schemas.openxmlformats.org/officeDocument/2006/relationships" xmlns:p="http://schemas.openxmlformats.org/presentationml/2006/main">
+  <p:cSld>
+    <p:spTree>
+      <p:nvGrpSpPr>
+        <p:cNvPr id="1" name=""/>
+        <p:cNvGrpSpPr/>
+        <p:nvPr/>
+      </p:nvGrpSpPr>
+      <p:grpSpPr>
+        <a:xfrm>
+          <a:off x="0" y="0"/>
+          <a:ext cx="0" cy="0"/>
+          <a:chOff x="0" y="0"/>
+          <a:chExt cx="0" cy="0"/>
+        </a:xfrm>
+      </p:grpSpPr>
+      <p:sp>
+        <p:nvSpPr>
+          <p:cNvPr id="2" name="Diakép helye 1"/>
+          <p:cNvSpPr>
+            <a:spLocks noGrp="1" noRot="1" noChangeAspect="1"/>
+          </p:cNvSpPr>
+          <p:nvPr>
+            <p:ph type="sldImg"/>
+          </p:nvPr>
+        </p:nvSpPr>
+        <p:spPr>
+          <a:xfrm>
+            <a:off x="1257300" y="720725"/>
+            <a:ext cx="4800600" cy="3600450"/>
+          </a:xfrm>
+        </p:spPr>
+      </p:sp>
+      <p:sp>
+        <p:nvSpPr>
+          <p:cNvPr id="3" name="Jegyzetek helye 2"/>
+          <p:cNvSpPr>
+            <a:spLocks noGrp="1"/>
+          </p:cNvSpPr>
+          <p:nvPr>
+            <p:ph type="body" idx="1"/>
+          </p:nvPr>
+        </p:nvSpPr>
+        <p:spPr/>
+        <p:txBody>
+          <a:bodyPr/>
+          <a:lstStyle/>
+          <a:p>
+            <a:endParaRPr lang="hu-HU" dirty="0"/>
+          </a:p>
+        </p:txBody>
+      </p:sp>
+      <p:sp>
+        <p:nvSpPr>
+          <p:cNvPr id="4" name="Dia számának helye 3"/>
+          <p:cNvSpPr>
+            <a:spLocks noGrp="1"/>
+          </p:cNvSpPr>
+          <p:nvPr>
+            <p:ph type="sldNum" sz="quarter" idx="10"/>
+          </p:nvPr>
+        </p:nvSpPr>
+        <p:spPr/>
+        <p:txBody>
+          <a:bodyPr/>
+          <a:lstStyle/>
+          <a:p>
+            <a:pPr>
+              <a:defRPr/>
+            </a:pPr>
+            <a:fld id="{94B52368-4B6A-484D-825F-033CAD33C64A}" type="slidenum">
+              <a:rPr lang="hu-HU" smtClean="0"/>
+              <a:pPr>
+                <a:defRPr/>
+              </a:pPr>
+              <a:t>16</a:t>
+            </a:fld>
+            <a:endParaRPr lang="hu-HU"/>
+          </a:p>
+        </p:txBody>
+      </p:sp>
+    </p:spTree>
+    <p:extLst>
+      <p:ext uri="{BB962C8B-B14F-4D97-AF65-F5344CB8AC3E}">
+        <p14:creationId xmlns:p14="http://schemas.microsoft.com/office/powerpoint/2010/main" val="3645084408"/>
+      </p:ext>
+    </p:extLst>
+  </p:cSld>
+  <p:clrMapOvr>
+    <a:masterClrMapping/>
+  </p:clrMapOvr>
+</p:notes>
+</file>
+
+<file path=ppt/notesSlides/notesSlide17.xml><?xml version="1.0" encoding="utf-8"?>
+<p:notes xmlns:a="http://schemas.openxmlformats.org/drawingml/2006/main" xmlns:r="http://schemas.openxmlformats.org/officeDocument/2006/relationships" xmlns:p="http://schemas.openxmlformats.org/presentationml/2006/main">
+  <p:cSld>
+    <p:spTree>
+      <p:nvGrpSpPr>
+        <p:cNvPr id="1" name=""/>
+        <p:cNvGrpSpPr/>
+        <p:nvPr/>
+      </p:nvGrpSpPr>
+      <p:grpSpPr>
+        <a:xfrm>
+          <a:off x="0" y="0"/>
+          <a:ext cx="0" cy="0"/>
+          <a:chOff x="0" y="0"/>
+          <a:chExt cx="0" cy="0"/>
+        </a:xfrm>
+      </p:grpSpPr>
+      <p:sp>
+        <p:nvSpPr>
+          <p:cNvPr id="2" name="Diakép helye 1"/>
+          <p:cNvSpPr>
+            <a:spLocks noGrp="1" noRot="1" noChangeAspect="1"/>
+          </p:cNvSpPr>
+          <p:nvPr>
+            <p:ph type="sldImg"/>
+          </p:nvPr>
+        </p:nvSpPr>
+        <p:spPr>
+          <a:xfrm>
+            <a:off x="1257300" y="720725"/>
+            <a:ext cx="4800600" cy="3600450"/>
+          </a:xfrm>
+        </p:spPr>
+      </p:sp>
+      <p:sp>
+        <p:nvSpPr>
+          <p:cNvPr id="3" name="Jegyzetek helye 2"/>
+          <p:cNvSpPr>
+            <a:spLocks noGrp="1"/>
+          </p:cNvSpPr>
+          <p:nvPr>
+            <p:ph type="body" idx="1"/>
+          </p:nvPr>
+        </p:nvSpPr>
+        <p:spPr/>
+        <p:txBody>
+          <a:bodyPr/>
+          <a:lstStyle/>
+          <a:p>
+            <a:endParaRPr lang="hu-HU" dirty="0"/>
+          </a:p>
+        </p:txBody>
+      </p:sp>
+      <p:sp>
+        <p:nvSpPr>
+          <p:cNvPr id="4" name="Dia számának helye 3"/>
+          <p:cNvSpPr>
+            <a:spLocks noGrp="1"/>
+          </p:cNvSpPr>
+          <p:nvPr>
+            <p:ph type="sldNum" sz="quarter" idx="10"/>
+          </p:nvPr>
+        </p:nvSpPr>
+        <p:spPr/>
+        <p:txBody>
+          <a:bodyPr/>
+          <a:lstStyle/>
+          <a:p>
+            <a:pPr>
+              <a:defRPr/>
+            </a:pPr>
+            <a:fld id="{94B52368-4B6A-484D-825F-033CAD33C64A}" type="slidenum">
+              <a:rPr lang="hu-HU" smtClean="0"/>
+              <a:pPr>
+                <a:defRPr/>
+              </a:pPr>
+              <a:t>17</a:t>
+            </a:fld>
+            <a:endParaRPr lang="hu-HU"/>
+          </a:p>
+        </p:txBody>
+      </p:sp>
+    </p:spTree>
+    <p:extLst>
+      <p:ext uri="{BB962C8B-B14F-4D97-AF65-F5344CB8AC3E}">
+        <p14:creationId xmlns:p14="http://schemas.microsoft.com/office/powerpoint/2010/main" val="131159969"/>
+      </p:ext>
+    </p:extLst>
+  </p:cSld>
+  <p:clrMapOvr>
+    <a:masterClrMapping/>
+  </p:clrMapOvr>
+</p:notes>
+</file>
+
+<file path=ppt/notesSlides/notesSlide18.xml><?xml version="1.0" encoding="utf-8"?>
+<p:notes xmlns:a="http://schemas.openxmlformats.org/drawingml/2006/main" xmlns:r="http://schemas.openxmlformats.org/officeDocument/2006/relationships" xmlns:p="http://schemas.openxmlformats.org/presentationml/2006/main">
+  <p:cSld>
+    <p:spTree>
+      <p:nvGrpSpPr>
+        <p:cNvPr id="1" name=""/>
+        <p:cNvGrpSpPr/>
+        <p:nvPr/>
+      </p:nvGrpSpPr>
+      <p:grpSpPr>
+        <a:xfrm>
+          <a:off x="0" y="0"/>
+          <a:ext cx="0" cy="0"/>
+          <a:chOff x="0" y="0"/>
+          <a:chExt cx="0" cy="0"/>
+        </a:xfrm>
+      </p:grpSpPr>
+      <p:sp>
+        <p:nvSpPr>
+          <p:cNvPr id="2" name="Diakép helye 1"/>
+          <p:cNvSpPr>
+            <a:spLocks noGrp="1" noRot="1" noChangeAspect="1"/>
+          </p:cNvSpPr>
+          <p:nvPr>
+            <p:ph type="sldImg"/>
+          </p:nvPr>
+        </p:nvSpPr>
+        <p:spPr>
+          <a:xfrm>
+            <a:off x="1257300" y="720725"/>
+            <a:ext cx="4800600" cy="3600450"/>
+          </a:xfrm>
+        </p:spPr>
+      </p:sp>
+      <p:sp>
+        <p:nvSpPr>
+          <p:cNvPr id="3" name="Jegyzetek helye 2"/>
+          <p:cNvSpPr>
+            <a:spLocks noGrp="1"/>
+          </p:cNvSpPr>
+          <p:nvPr>
+            <p:ph type="body" idx="1"/>
+          </p:nvPr>
+        </p:nvSpPr>
+        <p:spPr/>
+        <p:txBody>
+          <a:bodyPr/>
+          <a:lstStyle/>
+          <a:p>
+            <a:endParaRPr lang="hu-HU" dirty="0"/>
+          </a:p>
+        </p:txBody>
+      </p:sp>
+      <p:sp>
+        <p:nvSpPr>
+          <p:cNvPr id="4" name="Dia számának helye 3"/>
+          <p:cNvSpPr>
+            <a:spLocks noGrp="1"/>
+          </p:cNvSpPr>
+          <p:nvPr>
+            <p:ph type="sldNum" sz="quarter" idx="10"/>
+          </p:nvPr>
+        </p:nvSpPr>
+        <p:spPr/>
+        <p:txBody>
+          <a:bodyPr/>
+          <a:lstStyle/>
+          <a:p>
+            <a:pPr>
+              <a:defRPr/>
+            </a:pPr>
+            <a:fld id="{94B52368-4B6A-484D-825F-033CAD33C64A}" type="slidenum">
+              <a:rPr lang="hu-HU" smtClean="0"/>
+              <a:pPr>
+                <a:defRPr/>
+              </a:pPr>
+              <a:t>18</a:t>
+            </a:fld>
+            <a:endParaRPr lang="hu-HU"/>
+          </a:p>
+        </p:txBody>
+      </p:sp>
+    </p:spTree>
+    <p:extLst>
+      <p:ext uri="{BB962C8B-B14F-4D97-AF65-F5344CB8AC3E}">
+        <p14:creationId xmlns:p14="http://schemas.microsoft.com/office/powerpoint/2010/main" val="467878376"/>
       </p:ext>
     </p:extLst>
   </p:cSld>
@@ -5707,19 +5995,7 @@
               <a:rPr lang="en-US" smtClean="0">
                 <a:latin typeface="+mj-lt"/>
               </a:rPr>
-              <a:t>lice_data method/function can </a:t>
-            </a:r>
-            <a:r>
-              <a:rPr lang="en-US" smtClean="0">
-                <a:latin typeface="+mj-lt"/>
-              </a:rPr>
-              <a:t>do multiple </a:t>
-            </a:r>
-            <a:r>
-              <a:rPr lang="en-US" smtClean="0">
-                <a:latin typeface="+mj-lt"/>
-              </a:rPr>
-              <a:t>things:</a:t>
+              <a:t>lice_data method/function can do multiple things:</a:t>
             </a:r>
           </a:p>
           <a:p>
@@ -5743,13 +6019,7 @@
               <a:rPr lang="en-US" smtClean="0">
                 <a:latin typeface="+mj-lt"/>
               </a:rPr>
-              <a:t>Convert part of the data to a single value (Mean, Sum, Min, Max</a:t>
-            </a:r>
-            <a:r>
-              <a:rPr lang="en-US" smtClean="0">
-                <a:latin typeface="+mj-lt"/>
-              </a:rPr>
-              <a:t>)</a:t>
+              <a:t>Convert part of the data to a single value (Mean, Sum, Min, Max)</a:t>
             </a:r>
           </a:p>
           <a:p>
@@ -5769,31 +6039,19 @@
               </a:rPr>
               <a:t>ut out intervals and arrange them in a new dimension (multi-slice)</a:t>
             </a:r>
+          </a:p>
+          <a:p>
             <a:endParaRPr lang="en-US" smtClean="0">
               <a:latin typeface="+mj-lt"/>
             </a:endParaRPr>
           </a:p>
           <a:p>
-            <a:endParaRPr lang="en-US" smtClean="0">
-              <a:latin typeface="+mj-lt"/>
-            </a:endParaRPr>
-          </a:p>
-          <a:p>
-            <a:r>
-              <a:rPr lang="en-US" smtClean="0">
-                <a:latin typeface="+mj-lt"/>
-              </a:rPr>
-              <a:t>Slicing is done along coordinates</a:t>
-            </a:r>
-            <a:r>
-              <a:rPr lang="en-US" smtClean="0">
-                <a:latin typeface="+mj-lt"/>
-              </a:rPr>
-              <a:t>.</a:t>
-            </a:r>
-            <a:endParaRPr lang="en-US" smtClean="0">
-              <a:latin typeface="+mj-lt"/>
-            </a:endParaRPr>
+            <a:r>
+              <a:rPr lang="en-US" smtClean="0">
+                <a:latin typeface="+mj-lt"/>
+              </a:rPr>
+              <a:t>Slicing is done along coordinates.</a:t>
+            </a:r>
           </a:p>
           <a:p>
             <a:r>
@@ -6202,8 +6460,8 @@
         </p:nvSpPr>
         <p:spPr>
           <a:xfrm>
-            <a:off x="43428" y="499719"/>
-            <a:ext cx="9044049" cy="2031325"/>
+            <a:off x="36971" y="476601"/>
+            <a:ext cx="9044049" cy="2308324"/>
           </a:xfrm>
           <a:prstGeom prst="rect">
             <a:avLst/>
@@ -6301,8 +6559,63 @@
                 <a:latin typeface="+mj-lt"/>
                 <a:sym typeface="Wingdings" panose="05000000000000000000" pitchFamily="2" charset="2"/>
               </a:rPr>
-              <a:t>       Adds dimension from 1D data creates 2D: (intervals, index in intervals)</a:t>
-            </a:r>
+              <a:t>       Adds </a:t>
+            </a:r>
+            <a:r>
+              <a:rPr lang="en-US" smtClean="0">
+                <a:latin typeface="+mj-lt"/>
+                <a:sym typeface="Wingdings" panose="05000000000000000000" pitchFamily="2" charset="2"/>
+              </a:rPr>
+              <a:t>dimension</a:t>
+            </a:r>
+            <a:r>
+              <a:rPr lang="hu-HU" smtClean="0">
+                <a:latin typeface="+mj-lt"/>
+                <a:sym typeface="Wingdings" panose="05000000000000000000" pitchFamily="2" charset="2"/>
+              </a:rPr>
+              <a:t>: e.g.</a:t>
+            </a:r>
+            <a:r>
+              <a:rPr lang="en-US" smtClean="0">
+                <a:latin typeface="+mj-lt"/>
+                <a:sym typeface="Wingdings" panose="05000000000000000000" pitchFamily="2" charset="2"/>
+              </a:rPr>
+              <a:t> </a:t>
+            </a:r>
+            <a:r>
+              <a:rPr lang="en-US" smtClean="0">
+                <a:latin typeface="+mj-lt"/>
+                <a:sym typeface="Wingdings" panose="05000000000000000000" pitchFamily="2" charset="2"/>
+              </a:rPr>
+              <a:t>from 1D data creates 2D: (intervals, index in intervals</a:t>
+            </a:r>
+            <a:r>
+              <a:rPr lang="en-US" smtClean="0">
+                <a:latin typeface="+mj-lt"/>
+                <a:sym typeface="Wingdings" panose="05000000000000000000" pitchFamily="2" charset="2"/>
+              </a:rPr>
+              <a:t>)</a:t>
+            </a:r>
+          </a:p>
+          <a:p>
+            <a:r>
+              <a:rPr lang="en-US">
+                <a:latin typeface="+mj-lt"/>
+                <a:sym typeface="Wingdings" panose="05000000000000000000" pitchFamily="2" charset="2"/>
+              </a:rPr>
+              <a:t> </a:t>
+            </a:r>
+            <a:r>
+              <a:rPr lang="en-US" smtClean="0">
+                <a:latin typeface="+mj-lt"/>
+                <a:sym typeface="Wingdings" panose="05000000000000000000" pitchFamily="2" charset="2"/>
+              </a:rPr>
+              <a:t>                                             from 2D data (Time, channel) creates 3D</a:t>
+            </a:r>
+            <a:endParaRPr lang="en-US" smtClean="0">
+              <a:latin typeface="+mj-lt"/>
+              <a:sym typeface="Wingdings" panose="05000000000000000000" pitchFamily="2" charset="2"/>
+            </a:endParaRPr>
           </a:p>
           <a:p>
             <a:endParaRPr lang="en-US" smtClean="0">
@@ -6404,101 +6717,1288 @@
           </a:fontRef>
         </p:style>
       </p:cxnSp>
-      <p:pic>
-        <p:nvPicPr>
-          <p:cNvPr id="3" name="Kép 2"/>
-          <p:cNvPicPr>
-            <a:picLocks noChangeAspect="1"/>
-          </p:cNvPicPr>
+      <p:grpSp>
+        <p:nvGrpSpPr>
+          <p:cNvPr id="49" name="Csoportba foglalás 48"/>
+          <p:cNvGrpSpPr/>
           <p:nvPr/>
-        </p:nvPicPr>
-        <p:blipFill rotWithShape="1">
-          <a:blip r:embed="rId3"/>
-          <a:srcRect t="-1" b="5267"/>
-          <a:stretch/>
-        </p:blipFill>
+        </p:nvGrpSpPr>
+        <p:grpSpPr>
+          <a:xfrm>
+            <a:off x="2214785" y="4412897"/>
+            <a:ext cx="2738605" cy="145318"/>
+            <a:chOff x="2228570" y="4392796"/>
+            <a:chExt cx="2738605" cy="197584"/>
+          </a:xfrm>
+        </p:grpSpPr>
+        <p:sp>
+          <p:nvSpPr>
+            <p:cNvPr id="2" name="Téglalap 1"/>
+            <p:cNvSpPr/>
+            <p:nvPr/>
+          </p:nvSpPr>
+          <p:spPr>
+            <a:xfrm>
+              <a:off x="2228570" y="4392796"/>
+              <a:ext cx="2738605" cy="197584"/>
+            </a:xfrm>
+            <a:prstGeom prst="rect">
+              <a:avLst/>
+            </a:prstGeom>
+          </p:spPr>
+          <p:style>
+            <a:lnRef idx="2">
+              <a:schemeClr val="accent1">
+                <a:shade val="50000"/>
+              </a:schemeClr>
+            </a:lnRef>
+            <a:fillRef idx="1">
+              <a:schemeClr val="accent1"/>
+            </a:fillRef>
+            <a:effectRef idx="0">
+              <a:schemeClr val="accent1"/>
+            </a:effectRef>
+            <a:fontRef idx="minor">
+              <a:schemeClr val="lt1"/>
+            </a:fontRef>
+          </p:style>
+          <p:txBody>
+            <a:bodyPr rtlCol="0" anchor="ctr"/>
+            <a:lstStyle/>
+            <a:p>
+              <a:pPr algn="ctr"/>
+              <a:endParaRPr lang="en-US"/>
+            </a:p>
+          </p:txBody>
+        </p:sp>
+        <p:sp>
+          <p:nvSpPr>
+            <p:cNvPr id="11" name="Téglalap 10"/>
+            <p:cNvSpPr/>
+            <p:nvPr/>
+          </p:nvSpPr>
+          <p:spPr>
+            <a:xfrm>
+              <a:off x="2321236" y="4402751"/>
+              <a:ext cx="196818" cy="183034"/>
+            </a:xfrm>
+            <a:prstGeom prst="rect">
+              <a:avLst/>
+            </a:prstGeom>
+            <a:ln>
+              <a:solidFill>
+                <a:schemeClr val="tx1"/>
+              </a:solidFill>
+            </a:ln>
+          </p:spPr>
+          <p:style>
+            <a:lnRef idx="2">
+              <a:schemeClr val="accent1">
+                <a:shade val="50000"/>
+              </a:schemeClr>
+            </a:lnRef>
+            <a:fillRef idx="1">
+              <a:schemeClr val="accent1"/>
+            </a:fillRef>
+            <a:effectRef idx="0">
+              <a:schemeClr val="accent1"/>
+            </a:effectRef>
+            <a:fontRef idx="minor">
+              <a:schemeClr val="lt1"/>
+            </a:fontRef>
+          </p:style>
+          <p:txBody>
+            <a:bodyPr rtlCol="0" anchor="ctr"/>
+            <a:lstStyle/>
+            <a:p>
+              <a:pPr algn="ctr"/>
+              <a:endParaRPr lang="en-US"/>
+            </a:p>
+          </p:txBody>
+        </p:sp>
+        <p:sp>
+          <p:nvSpPr>
+            <p:cNvPr id="20" name="Téglalap 19"/>
+            <p:cNvSpPr/>
+            <p:nvPr/>
+          </p:nvSpPr>
+          <p:spPr>
+            <a:xfrm>
+              <a:off x="2694196" y="4403516"/>
+              <a:ext cx="196818" cy="183034"/>
+            </a:xfrm>
+            <a:prstGeom prst="rect">
+              <a:avLst/>
+            </a:prstGeom>
+            <a:ln>
+              <a:solidFill>
+                <a:schemeClr val="tx1"/>
+              </a:solidFill>
+            </a:ln>
+          </p:spPr>
+          <p:style>
+            <a:lnRef idx="2">
+              <a:schemeClr val="accent1">
+                <a:shade val="50000"/>
+              </a:schemeClr>
+            </a:lnRef>
+            <a:fillRef idx="1">
+              <a:schemeClr val="accent1"/>
+            </a:fillRef>
+            <a:effectRef idx="0">
+              <a:schemeClr val="accent1"/>
+            </a:effectRef>
+            <a:fontRef idx="minor">
+              <a:schemeClr val="lt1"/>
+            </a:fontRef>
+          </p:style>
+          <p:txBody>
+            <a:bodyPr rtlCol="0" anchor="ctr"/>
+            <a:lstStyle/>
+            <a:p>
+              <a:pPr algn="ctr"/>
+              <a:endParaRPr lang="en-US"/>
+            </a:p>
+          </p:txBody>
+        </p:sp>
+        <p:sp>
+          <p:nvSpPr>
+            <p:cNvPr id="21" name="Téglalap 20"/>
+            <p:cNvSpPr/>
+            <p:nvPr/>
+          </p:nvSpPr>
+          <p:spPr>
+            <a:xfrm>
+              <a:off x="3067156" y="4404281"/>
+              <a:ext cx="196818" cy="183034"/>
+            </a:xfrm>
+            <a:prstGeom prst="rect">
+              <a:avLst/>
+            </a:prstGeom>
+            <a:ln>
+              <a:solidFill>
+                <a:schemeClr val="tx1"/>
+              </a:solidFill>
+            </a:ln>
+          </p:spPr>
+          <p:style>
+            <a:lnRef idx="2">
+              <a:schemeClr val="accent1">
+                <a:shade val="50000"/>
+              </a:schemeClr>
+            </a:lnRef>
+            <a:fillRef idx="1">
+              <a:schemeClr val="accent1"/>
+            </a:fillRef>
+            <a:effectRef idx="0">
+              <a:schemeClr val="accent1"/>
+            </a:effectRef>
+            <a:fontRef idx="minor">
+              <a:schemeClr val="lt1"/>
+            </a:fontRef>
+          </p:style>
+          <p:txBody>
+            <a:bodyPr rtlCol="0" anchor="ctr"/>
+            <a:lstStyle/>
+            <a:p>
+              <a:pPr algn="ctr"/>
+              <a:endParaRPr lang="en-US"/>
+            </a:p>
+          </p:txBody>
+        </p:sp>
+        <p:sp>
+          <p:nvSpPr>
+            <p:cNvPr id="22" name="Téglalap 21"/>
+            <p:cNvSpPr/>
+            <p:nvPr/>
+          </p:nvSpPr>
+          <p:spPr>
+            <a:xfrm>
+              <a:off x="3440116" y="4405046"/>
+              <a:ext cx="196818" cy="183034"/>
+            </a:xfrm>
+            <a:prstGeom prst="rect">
+              <a:avLst/>
+            </a:prstGeom>
+            <a:ln>
+              <a:solidFill>
+                <a:schemeClr val="tx1"/>
+              </a:solidFill>
+            </a:ln>
+          </p:spPr>
+          <p:style>
+            <a:lnRef idx="2">
+              <a:schemeClr val="accent1">
+                <a:shade val="50000"/>
+              </a:schemeClr>
+            </a:lnRef>
+            <a:fillRef idx="1">
+              <a:schemeClr val="accent1"/>
+            </a:fillRef>
+            <a:effectRef idx="0">
+              <a:schemeClr val="accent1"/>
+            </a:effectRef>
+            <a:fontRef idx="minor">
+              <a:schemeClr val="lt1"/>
+            </a:fontRef>
+          </p:style>
+          <p:txBody>
+            <a:bodyPr rtlCol="0" anchor="ctr"/>
+            <a:lstStyle/>
+            <a:p>
+              <a:pPr algn="ctr"/>
+              <a:endParaRPr lang="en-US"/>
+            </a:p>
+          </p:txBody>
+        </p:sp>
+        <p:sp>
+          <p:nvSpPr>
+            <p:cNvPr id="23" name="Téglalap 22"/>
+            <p:cNvSpPr/>
+            <p:nvPr/>
+          </p:nvSpPr>
+          <p:spPr>
+            <a:xfrm>
+              <a:off x="3813076" y="4405811"/>
+              <a:ext cx="196818" cy="183034"/>
+            </a:xfrm>
+            <a:prstGeom prst="rect">
+              <a:avLst/>
+            </a:prstGeom>
+            <a:ln>
+              <a:solidFill>
+                <a:schemeClr val="tx1"/>
+              </a:solidFill>
+            </a:ln>
+          </p:spPr>
+          <p:style>
+            <a:lnRef idx="2">
+              <a:schemeClr val="accent1">
+                <a:shade val="50000"/>
+              </a:schemeClr>
+            </a:lnRef>
+            <a:fillRef idx="1">
+              <a:schemeClr val="accent1"/>
+            </a:fillRef>
+            <a:effectRef idx="0">
+              <a:schemeClr val="accent1"/>
+            </a:effectRef>
+            <a:fontRef idx="minor">
+              <a:schemeClr val="lt1"/>
+            </a:fontRef>
+          </p:style>
+          <p:txBody>
+            <a:bodyPr rtlCol="0" anchor="ctr"/>
+            <a:lstStyle/>
+            <a:p>
+              <a:pPr algn="ctr"/>
+              <a:endParaRPr lang="en-US"/>
+            </a:p>
+          </p:txBody>
+        </p:sp>
+        <p:sp>
+          <p:nvSpPr>
+            <p:cNvPr id="24" name="Téglalap 23"/>
+            <p:cNvSpPr/>
+            <p:nvPr/>
+          </p:nvSpPr>
+          <p:spPr>
+            <a:xfrm>
+              <a:off x="4186036" y="4406576"/>
+              <a:ext cx="196818" cy="183034"/>
+            </a:xfrm>
+            <a:prstGeom prst="rect">
+              <a:avLst/>
+            </a:prstGeom>
+            <a:ln>
+              <a:solidFill>
+                <a:schemeClr val="tx1"/>
+              </a:solidFill>
+            </a:ln>
+          </p:spPr>
+          <p:style>
+            <a:lnRef idx="2">
+              <a:schemeClr val="accent1">
+                <a:shade val="50000"/>
+              </a:schemeClr>
+            </a:lnRef>
+            <a:fillRef idx="1">
+              <a:schemeClr val="accent1"/>
+            </a:fillRef>
+            <a:effectRef idx="0">
+              <a:schemeClr val="accent1"/>
+            </a:effectRef>
+            <a:fontRef idx="minor">
+              <a:schemeClr val="lt1"/>
+            </a:fontRef>
+          </p:style>
+          <p:txBody>
+            <a:bodyPr rtlCol="0" anchor="ctr"/>
+            <a:lstStyle/>
+            <a:p>
+              <a:pPr algn="ctr"/>
+              <a:endParaRPr lang="en-US"/>
+            </a:p>
+          </p:txBody>
+        </p:sp>
+        <p:sp>
+          <p:nvSpPr>
+            <p:cNvPr id="25" name="Téglalap 24"/>
+            <p:cNvSpPr/>
+            <p:nvPr/>
+          </p:nvSpPr>
+          <p:spPr>
+            <a:xfrm>
+              <a:off x="4558996" y="4407341"/>
+              <a:ext cx="196818" cy="183034"/>
+            </a:xfrm>
+            <a:prstGeom prst="rect">
+              <a:avLst/>
+            </a:prstGeom>
+            <a:ln>
+              <a:solidFill>
+                <a:schemeClr val="tx1"/>
+              </a:solidFill>
+            </a:ln>
+          </p:spPr>
+          <p:style>
+            <a:lnRef idx="2">
+              <a:schemeClr val="accent1">
+                <a:shade val="50000"/>
+              </a:schemeClr>
+            </a:lnRef>
+            <a:fillRef idx="1">
+              <a:schemeClr val="accent1"/>
+            </a:fillRef>
+            <a:effectRef idx="0">
+              <a:schemeClr val="accent1"/>
+            </a:effectRef>
+            <a:fontRef idx="minor">
+              <a:schemeClr val="lt1"/>
+            </a:fontRef>
+          </p:style>
+          <p:txBody>
+            <a:bodyPr rtlCol="0" anchor="ctr"/>
+            <a:lstStyle/>
+            <a:p>
+              <a:pPr algn="ctr"/>
+              <a:endParaRPr lang="en-US"/>
+            </a:p>
+          </p:txBody>
+        </p:sp>
+      </p:grpSp>
+      <p:grpSp>
+        <p:nvGrpSpPr>
+          <p:cNvPr id="5" name="Csoportba foglalás 4"/>
+          <p:cNvGrpSpPr/>
+          <p:nvPr/>
+        </p:nvGrpSpPr>
+        <p:grpSpPr>
+          <a:xfrm>
+            <a:off x="1192695" y="2954975"/>
+            <a:ext cx="385355" cy="1301884"/>
+            <a:chOff x="4170382" y="2784961"/>
+            <a:chExt cx="196818" cy="1301884"/>
+          </a:xfrm>
+        </p:grpSpPr>
+        <p:sp>
+          <p:nvSpPr>
+            <p:cNvPr id="26" name="Téglalap 25"/>
+            <p:cNvSpPr/>
+            <p:nvPr/>
+          </p:nvSpPr>
+          <p:spPr>
+            <a:xfrm>
+              <a:off x="4170382" y="3903811"/>
+              <a:ext cx="196818" cy="183034"/>
+            </a:xfrm>
+            <a:prstGeom prst="rect">
+              <a:avLst/>
+            </a:prstGeom>
+            <a:ln>
+              <a:solidFill>
+                <a:schemeClr val="tx1"/>
+              </a:solidFill>
+            </a:ln>
+          </p:spPr>
+          <p:style>
+            <a:lnRef idx="2">
+              <a:schemeClr val="accent1">
+                <a:shade val="50000"/>
+              </a:schemeClr>
+            </a:lnRef>
+            <a:fillRef idx="1">
+              <a:schemeClr val="accent1"/>
+            </a:fillRef>
+            <a:effectRef idx="0">
+              <a:schemeClr val="accent1"/>
+            </a:effectRef>
+            <a:fontRef idx="minor">
+              <a:schemeClr val="lt1"/>
+            </a:fontRef>
+          </p:style>
+          <p:txBody>
+            <a:bodyPr rtlCol="0" anchor="ctr"/>
+            <a:lstStyle/>
+            <a:p>
+              <a:pPr algn="ctr"/>
+              <a:endParaRPr lang="en-US"/>
+            </a:p>
+          </p:txBody>
+        </p:sp>
+        <p:sp>
+          <p:nvSpPr>
+            <p:cNvPr id="27" name="Téglalap 26"/>
+            <p:cNvSpPr/>
+            <p:nvPr/>
+          </p:nvSpPr>
+          <p:spPr>
+            <a:xfrm>
+              <a:off x="4170382" y="3717336"/>
+              <a:ext cx="196818" cy="183034"/>
+            </a:xfrm>
+            <a:prstGeom prst="rect">
+              <a:avLst/>
+            </a:prstGeom>
+            <a:ln>
+              <a:solidFill>
+                <a:schemeClr val="tx1"/>
+              </a:solidFill>
+            </a:ln>
+          </p:spPr>
+          <p:style>
+            <a:lnRef idx="2">
+              <a:schemeClr val="accent1">
+                <a:shade val="50000"/>
+              </a:schemeClr>
+            </a:lnRef>
+            <a:fillRef idx="1">
+              <a:schemeClr val="accent1"/>
+            </a:fillRef>
+            <a:effectRef idx="0">
+              <a:schemeClr val="accent1"/>
+            </a:effectRef>
+            <a:fontRef idx="minor">
+              <a:schemeClr val="lt1"/>
+            </a:fontRef>
+          </p:style>
+          <p:txBody>
+            <a:bodyPr rtlCol="0" anchor="ctr"/>
+            <a:lstStyle/>
+            <a:p>
+              <a:pPr algn="ctr"/>
+              <a:endParaRPr lang="en-US"/>
+            </a:p>
+          </p:txBody>
+        </p:sp>
+        <p:sp>
+          <p:nvSpPr>
+            <p:cNvPr id="28" name="Téglalap 27"/>
+            <p:cNvSpPr/>
+            <p:nvPr/>
+          </p:nvSpPr>
+          <p:spPr>
+            <a:xfrm>
+              <a:off x="4170382" y="3530861"/>
+              <a:ext cx="196818" cy="183034"/>
+            </a:xfrm>
+            <a:prstGeom prst="rect">
+              <a:avLst/>
+            </a:prstGeom>
+            <a:ln>
+              <a:solidFill>
+                <a:schemeClr val="tx1"/>
+              </a:solidFill>
+            </a:ln>
+          </p:spPr>
+          <p:style>
+            <a:lnRef idx="2">
+              <a:schemeClr val="accent1">
+                <a:shade val="50000"/>
+              </a:schemeClr>
+            </a:lnRef>
+            <a:fillRef idx="1">
+              <a:schemeClr val="accent1"/>
+            </a:fillRef>
+            <a:effectRef idx="0">
+              <a:schemeClr val="accent1"/>
+            </a:effectRef>
+            <a:fontRef idx="minor">
+              <a:schemeClr val="lt1"/>
+            </a:fontRef>
+          </p:style>
+          <p:txBody>
+            <a:bodyPr rtlCol="0" anchor="ctr"/>
+            <a:lstStyle/>
+            <a:p>
+              <a:pPr algn="ctr"/>
+              <a:endParaRPr lang="en-US"/>
+            </a:p>
+          </p:txBody>
+        </p:sp>
+        <p:sp>
+          <p:nvSpPr>
+            <p:cNvPr id="29" name="Téglalap 28"/>
+            <p:cNvSpPr/>
+            <p:nvPr/>
+          </p:nvSpPr>
+          <p:spPr>
+            <a:xfrm>
+              <a:off x="4170382" y="3344386"/>
+              <a:ext cx="196818" cy="183034"/>
+            </a:xfrm>
+            <a:prstGeom prst="rect">
+              <a:avLst/>
+            </a:prstGeom>
+            <a:ln>
+              <a:solidFill>
+                <a:schemeClr val="tx1"/>
+              </a:solidFill>
+            </a:ln>
+          </p:spPr>
+          <p:style>
+            <a:lnRef idx="2">
+              <a:schemeClr val="accent1">
+                <a:shade val="50000"/>
+              </a:schemeClr>
+            </a:lnRef>
+            <a:fillRef idx="1">
+              <a:schemeClr val="accent1"/>
+            </a:fillRef>
+            <a:effectRef idx="0">
+              <a:schemeClr val="accent1"/>
+            </a:effectRef>
+            <a:fontRef idx="minor">
+              <a:schemeClr val="lt1"/>
+            </a:fontRef>
+          </p:style>
+          <p:txBody>
+            <a:bodyPr rtlCol="0" anchor="ctr"/>
+            <a:lstStyle/>
+            <a:p>
+              <a:pPr algn="ctr"/>
+              <a:endParaRPr lang="en-US"/>
+            </a:p>
+          </p:txBody>
+        </p:sp>
+        <p:sp>
+          <p:nvSpPr>
+            <p:cNvPr id="30" name="Téglalap 29"/>
+            <p:cNvSpPr/>
+            <p:nvPr/>
+          </p:nvSpPr>
+          <p:spPr>
+            <a:xfrm>
+              <a:off x="4170382" y="3157911"/>
+              <a:ext cx="196818" cy="183034"/>
+            </a:xfrm>
+            <a:prstGeom prst="rect">
+              <a:avLst/>
+            </a:prstGeom>
+            <a:ln>
+              <a:solidFill>
+                <a:schemeClr val="tx1"/>
+              </a:solidFill>
+            </a:ln>
+          </p:spPr>
+          <p:style>
+            <a:lnRef idx="2">
+              <a:schemeClr val="accent1">
+                <a:shade val="50000"/>
+              </a:schemeClr>
+            </a:lnRef>
+            <a:fillRef idx="1">
+              <a:schemeClr val="accent1"/>
+            </a:fillRef>
+            <a:effectRef idx="0">
+              <a:schemeClr val="accent1"/>
+            </a:effectRef>
+            <a:fontRef idx="minor">
+              <a:schemeClr val="lt1"/>
+            </a:fontRef>
+          </p:style>
+          <p:txBody>
+            <a:bodyPr rtlCol="0" anchor="ctr"/>
+            <a:lstStyle/>
+            <a:p>
+              <a:pPr algn="ctr"/>
+              <a:endParaRPr lang="en-US"/>
+            </a:p>
+          </p:txBody>
+        </p:sp>
+        <p:sp>
+          <p:nvSpPr>
+            <p:cNvPr id="31" name="Téglalap 30"/>
+            <p:cNvSpPr/>
+            <p:nvPr/>
+          </p:nvSpPr>
+          <p:spPr>
+            <a:xfrm>
+              <a:off x="4170382" y="2971436"/>
+              <a:ext cx="196818" cy="183034"/>
+            </a:xfrm>
+            <a:prstGeom prst="rect">
+              <a:avLst/>
+            </a:prstGeom>
+            <a:ln>
+              <a:solidFill>
+                <a:schemeClr val="tx1"/>
+              </a:solidFill>
+            </a:ln>
+          </p:spPr>
+          <p:style>
+            <a:lnRef idx="2">
+              <a:schemeClr val="accent1">
+                <a:shade val="50000"/>
+              </a:schemeClr>
+            </a:lnRef>
+            <a:fillRef idx="1">
+              <a:schemeClr val="accent1"/>
+            </a:fillRef>
+            <a:effectRef idx="0">
+              <a:schemeClr val="accent1"/>
+            </a:effectRef>
+            <a:fontRef idx="minor">
+              <a:schemeClr val="lt1"/>
+            </a:fontRef>
+          </p:style>
+          <p:txBody>
+            <a:bodyPr rtlCol="0" anchor="ctr"/>
+            <a:lstStyle/>
+            <a:p>
+              <a:pPr algn="ctr"/>
+              <a:endParaRPr lang="en-US"/>
+            </a:p>
+          </p:txBody>
+        </p:sp>
+        <p:sp>
+          <p:nvSpPr>
+            <p:cNvPr id="32" name="Téglalap 31"/>
+            <p:cNvSpPr/>
+            <p:nvPr/>
+          </p:nvSpPr>
+          <p:spPr>
+            <a:xfrm>
+              <a:off x="4170382" y="2784961"/>
+              <a:ext cx="196818" cy="183034"/>
+            </a:xfrm>
+            <a:prstGeom prst="rect">
+              <a:avLst/>
+            </a:prstGeom>
+            <a:ln>
+              <a:solidFill>
+                <a:schemeClr val="tx1"/>
+              </a:solidFill>
+            </a:ln>
+          </p:spPr>
+          <p:style>
+            <a:lnRef idx="2">
+              <a:schemeClr val="accent1">
+                <a:shade val="50000"/>
+              </a:schemeClr>
+            </a:lnRef>
+            <a:fillRef idx="1">
+              <a:schemeClr val="accent1"/>
+            </a:fillRef>
+            <a:effectRef idx="0">
+              <a:schemeClr val="accent1"/>
+            </a:effectRef>
+            <a:fontRef idx="minor">
+              <a:schemeClr val="lt1"/>
+            </a:fontRef>
+          </p:style>
+          <p:txBody>
+            <a:bodyPr rtlCol="0" anchor="ctr"/>
+            <a:lstStyle/>
+            <a:p>
+              <a:pPr algn="ctr"/>
+              <a:endParaRPr lang="en-US"/>
+            </a:p>
+          </p:txBody>
+        </p:sp>
+      </p:grpSp>
+      <p:sp>
+        <p:nvSpPr>
+          <p:cNvPr id="6" name="Ív 5"/>
+          <p:cNvSpPr/>
+          <p:nvPr/>
+        </p:nvSpPr>
         <p:spPr>
           <a:xfrm>
-            <a:off x="646174" y="2183401"/>
-            <a:ext cx="4488474" cy="697065"/>
+            <a:off x="918995" y="4144667"/>
+            <a:ext cx="1447417" cy="474048"/>
+          </a:xfrm>
+          <a:prstGeom prst="arc">
+            <a:avLst/>
+          </a:prstGeom>
+          <a:ln w="28575">
+            <a:solidFill>
+              <a:srgbClr val="D10101"/>
+            </a:solidFill>
+            <a:headEnd type="triangle"/>
+            <a:tailEnd type="none"/>
+          </a:ln>
+        </p:spPr>
+        <p:style>
+          <a:lnRef idx="1">
+            <a:schemeClr val="accent1"/>
+          </a:lnRef>
+          <a:fillRef idx="0">
+            <a:schemeClr val="accent1"/>
+          </a:fillRef>
+          <a:effectRef idx="0">
+            <a:schemeClr val="accent1"/>
+          </a:effectRef>
+          <a:fontRef idx="minor">
+            <a:schemeClr val="tx1"/>
+          </a:fontRef>
+        </p:style>
+        <p:txBody>
+          <a:bodyPr rtlCol="0" anchor="ctr"/>
+          <a:lstStyle/>
+          <a:p>
+            <a:pPr algn="ctr"/>
+            <a:endParaRPr lang="en-US"/>
+          </a:p>
+        </p:txBody>
+      </p:sp>
+      <p:sp>
+        <p:nvSpPr>
+          <p:cNvPr id="35" name="Ív 34"/>
+          <p:cNvSpPr/>
+          <p:nvPr/>
+        </p:nvSpPr>
+        <p:spPr>
+          <a:xfrm>
+            <a:off x="477877" y="3947084"/>
+            <a:ext cx="2283703" cy="850070"/>
+          </a:xfrm>
+          <a:prstGeom prst="arc">
+            <a:avLst/>
+          </a:prstGeom>
+          <a:ln w="28575">
+            <a:solidFill>
+              <a:srgbClr val="D10101"/>
+            </a:solidFill>
+            <a:headEnd type="triangle"/>
+            <a:tailEnd type="none"/>
+          </a:ln>
+        </p:spPr>
+        <p:style>
+          <a:lnRef idx="1">
+            <a:schemeClr val="accent1"/>
+          </a:lnRef>
+          <a:fillRef idx="0">
+            <a:schemeClr val="accent1"/>
+          </a:fillRef>
+          <a:effectRef idx="0">
+            <a:schemeClr val="accent1"/>
+          </a:effectRef>
+          <a:fontRef idx="minor">
+            <a:schemeClr val="tx1"/>
+          </a:fontRef>
+        </p:style>
+        <p:txBody>
+          <a:bodyPr rtlCol="0" anchor="ctr"/>
+          <a:lstStyle/>
+          <a:p>
+            <a:pPr algn="ctr"/>
+            <a:endParaRPr lang="en-US"/>
+          </a:p>
+        </p:txBody>
+      </p:sp>
+      <p:sp>
+        <p:nvSpPr>
+          <p:cNvPr id="36" name="Ív 35"/>
+          <p:cNvSpPr/>
+          <p:nvPr/>
+        </p:nvSpPr>
+        <p:spPr>
+          <a:xfrm>
+            <a:off x="78115" y="3781664"/>
+            <a:ext cx="3092417" cy="1176314"/>
+          </a:xfrm>
+          <a:prstGeom prst="arc">
+            <a:avLst/>
+          </a:prstGeom>
+          <a:ln w="28575">
+            <a:solidFill>
+              <a:srgbClr val="D10101"/>
+            </a:solidFill>
+            <a:headEnd type="triangle"/>
+            <a:tailEnd type="none"/>
+          </a:ln>
+        </p:spPr>
+        <p:style>
+          <a:lnRef idx="1">
+            <a:schemeClr val="accent1"/>
+          </a:lnRef>
+          <a:fillRef idx="0">
+            <a:schemeClr val="accent1"/>
+          </a:fillRef>
+          <a:effectRef idx="0">
+            <a:schemeClr val="accent1"/>
+          </a:effectRef>
+          <a:fontRef idx="minor">
+            <a:schemeClr val="tx1"/>
+          </a:fontRef>
+        </p:style>
+        <p:txBody>
+          <a:bodyPr rtlCol="0" anchor="ctr"/>
+          <a:lstStyle/>
+          <a:p>
+            <a:pPr algn="ctr"/>
+            <a:endParaRPr lang="en-US"/>
+          </a:p>
+        </p:txBody>
+      </p:sp>
+      <p:sp>
+        <p:nvSpPr>
+          <p:cNvPr id="37" name="Ív 36"/>
+          <p:cNvSpPr/>
+          <p:nvPr/>
+        </p:nvSpPr>
+        <p:spPr>
+          <a:xfrm>
+            <a:off x="-349217" y="3585058"/>
+            <a:ext cx="3873563" cy="1602669"/>
+          </a:xfrm>
+          <a:prstGeom prst="arc">
+            <a:avLst/>
+          </a:prstGeom>
+          <a:ln w="28575">
+            <a:solidFill>
+              <a:srgbClr val="D10101"/>
+            </a:solidFill>
+            <a:headEnd type="triangle"/>
+            <a:tailEnd type="none"/>
+          </a:ln>
+        </p:spPr>
+        <p:style>
+          <a:lnRef idx="1">
+            <a:schemeClr val="accent1"/>
+          </a:lnRef>
+          <a:fillRef idx="0">
+            <a:schemeClr val="accent1"/>
+          </a:fillRef>
+          <a:effectRef idx="0">
+            <a:schemeClr val="accent1"/>
+          </a:effectRef>
+          <a:fontRef idx="minor">
+            <a:schemeClr val="tx1"/>
+          </a:fontRef>
+        </p:style>
+        <p:txBody>
+          <a:bodyPr rtlCol="0" anchor="ctr"/>
+          <a:lstStyle/>
+          <a:p>
+            <a:pPr algn="ctr"/>
+            <a:endParaRPr lang="en-US"/>
+          </a:p>
+        </p:txBody>
+      </p:sp>
+      <p:sp>
+        <p:nvSpPr>
+          <p:cNvPr id="38" name="Ív 37"/>
+          <p:cNvSpPr/>
+          <p:nvPr/>
+        </p:nvSpPr>
+        <p:spPr>
+          <a:xfrm>
+            <a:off x="-703030" y="3400282"/>
+            <a:ext cx="4617950" cy="1939080"/>
+          </a:xfrm>
+          <a:prstGeom prst="arc">
+            <a:avLst/>
+          </a:prstGeom>
+          <a:ln w="28575">
+            <a:solidFill>
+              <a:srgbClr val="D10101"/>
+            </a:solidFill>
+            <a:headEnd type="triangle"/>
+            <a:tailEnd type="none"/>
+          </a:ln>
+        </p:spPr>
+        <p:style>
+          <a:lnRef idx="1">
+            <a:schemeClr val="accent1"/>
+          </a:lnRef>
+          <a:fillRef idx="0">
+            <a:schemeClr val="accent1"/>
+          </a:fillRef>
+          <a:effectRef idx="0">
+            <a:schemeClr val="accent1"/>
+          </a:effectRef>
+          <a:fontRef idx="minor">
+            <a:schemeClr val="tx1"/>
+          </a:fontRef>
+        </p:style>
+        <p:txBody>
+          <a:bodyPr rtlCol="0" anchor="ctr"/>
+          <a:lstStyle/>
+          <a:p>
+            <a:pPr algn="ctr"/>
+            <a:endParaRPr lang="en-US"/>
+          </a:p>
+        </p:txBody>
+      </p:sp>
+      <p:sp>
+        <p:nvSpPr>
+          <p:cNvPr id="39" name="Ív 38"/>
+          <p:cNvSpPr/>
+          <p:nvPr/>
+        </p:nvSpPr>
+        <p:spPr>
+          <a:xfrm>
+            <a:off x="-1139554" y="3234862"/>
+            <a:ext cx="5417475" cy="2297487"/>
+          </a:xfrm>
+          <a:prstGeom prst="arc">
+            <a:avLst/>
+          </a:prstGeom>
+          <a:ln w="28575">
+            <a:solidFill>
+              <a:srgbClr val="D10101"/>
+            </a:solidFill>
+            <a:headEnd type="triangle"/>
+            <a:tailEnd type="none"/>
+          </a:ln>
+        </p:spPr>
+        <p:style>
+          <a:lnRef idx="1">
+            <a:schemeClr val="accent1"/>
+          </a:lnRef>
+          <a:fillRef idx="0">
+            <a:schemeClr val="accent1"/>
+          </a:fillRef>
+          <a:effectRef idx="0">
+            <a:schemeClr val="accent1"/>
+          </a:effectRef>
+          <a:fontRef idx="minor">
+            <a:schemeClr val="tx1"/>
+          </a:fontRef>
+        </p:style>
+        <p:txBody>
+          <a:bodyPr rtlCol="0" anchor="ctr"/>
+          <a:lstStyle/>
+          <a:p>
+            <a:pPr algn="ctr"/>
+            <a:endParaRPr lang="en-US"/>
+          </a:p>
+        </p:txBody>
+      </p:sp>
+      <p:sp>
+        <p:nvSpPr>
+          <p:cNvPr id="40" name="Ív 39"/>
+          <p:cNvSpPr/>
+          <p:nvPr/>
+        </p:nvSpPr>
+        <p:spPr>
+          <a:xfrm>
+            <a:off x="-1497962" y="3051063"/>
+            <a:ext cx="6152672" cy="2632921"/>
+          </a:xfrm>
+          <a:prstGeom prst="arc">
+            <a:avLst/>
+          </a:prstGeom>
+          <a:ln w="28575">
+            <a:solidFill>
+              <a:srgbClr val="D10101"/>
+            </a:solidFill>
+            <a:headEnd type="triangle"/>
+            <a:tailEnd type="none"/>
+          </a:ln>
+        </p:spPr>
+        <p:style>
+          <a:lnRef idx="1">
+            <a:schemeClr val="accent1"/>
+          </a:lnRef>
+          <a:fillRef idx="0">
+            <a:schemeClr val="accent1"/>
+          </a:fillRef>
+          <a:effectRef idx="0">
+            <a:schemeClr val="accent1"/>
+          </a:effectRef>
+          <a:fontRef idx="minor">
+            <a:schemeClr val="tx1"/>
+          </a:fontRef>
+        </p:style>
+        <p:txBody>
+          <a:bodyPr rtlCol="0" anchor="ctr"/>
+          <a:lstStyle/>
+          <a:p>
+            <a:pPr algn="ctr"/>
+            <a:endParaRPr lang="en-US"/>
+          </a:p>
+        </p:txBody>
+      </p:sp>
+      <p:cxnSp>
+        <p:nvCxnSpPr>
+          <p:cNvPr id="41" name="Egyenes összekötő nyíllal 40"/>
+          <p:cNvCxnSpPr/>
+          <p:nvPr/>
+        </p:nvCxnSpPr>
+        <p:spPr>
+          <a:xfrm>
+            <a:off x="2173423" y="4856888"/>
+            <a:ext cx="2940784" cy="4595"/>
+          </a:xfrm>
+          <a:prstGeom prst="straightConnector1">
+            <a:avLst/>
+          </a:prstGeom>
+          <a:ln w="19050">
+            <a:solidFill>
+              <a:schemeClr val="tx1"/>
+            </a:solidFill>
+            <a:tailEnd type="triangle"/>
+          </a:ln>
+        </p:spPr>
+        <p:style>
+          <a:lnRef idx="1">
+            <a:schemeClr val="accent1"/>
+          </a:lnRef>
+          <a:fillRef idx="0">
+            <a:schemeClr val="accent1"/>
+          </a:fillRef>
+          <a:effectRef idx="0">
+            <a:schemeClr val="accent1"/>
+          </a:effectRef>
+          <a:fontRef idx="minor">
+            <a:schemeClr val="tx1"/>
+          </a:fontRef>
+        </p:style>
+      </p:cxnSp>
+      <p:sp>
+        <p:nvSpPr>
+          <p:cNvPr id="42" name="Szövegdoboz 41"/>
+          <p:cNvSpPr txBox="1"/>
+          <p:nvPr/>
+        </p:nvSpPr>
+        <p:spPr>
+          <a:xfrm>
+            <a:off x="4498481" y="4879857"/>
+            <a:ext cx="1167122" cy="369332"/>
           </a:xfrm>
           <a:prstGeom prst="rect">
             <a:avLst/>
           </a:prstGeom>
-        </p:spPr>
-      </p:pic>
-      <p:pic>
-        <p:nvPicPr>
-          <p:cNvPr id="7" name="Kép 6"/>
-          <p:cNvPicPr>
-            <a:picLocks noChangeAspect="1"/>
-          </p:cNvPicPr>
+          <a:noFill/>
+        </p:spPr>
+        <p:txBody>
+          <a:bodyPr wrap="square" rtlCol="0">
+            <a:spAutoFit/>
+          </a:bodyPr>
+          <a:lstStyle/>
+          <a:p>
+            <a:r>
+              <a:rPr lang="en-US" smtClean="0"/>
+              <a:t>Time</a:t>
+            </a:r>
+            <a:endParaRPr lang="en-US"/>
+          </a:p>
+        </p:txBody>
+      </p:sp>
+      <p:sp>
+        <p:nvSpPr>
+          <p:cNvPr id="43" name="Szövegdoboz 42"/>
+          <p:cNvSpPr txBox="1"/>
           <p:nvPr/>
-        </p:nvPicPr>
-        <p:blipFill>
-          <a:blip r:embed="rId4"/>
-          <a:stretch>
-            <a:fillRect/>
-          </a:stretch>
-        </p:blipFill>
+        </p:nvSpPr>
         <p:spPr>
           <a:xfrm>
-            <a:off x="140676" y="3996019"/>
-            <a:ext cx="7844621" cy="952667"/>
+            <a:off x="997120" y="4503640"/>
+            <a:ext cx="1167122" cy="276999"/>
           </a:xfrm>
           <a:prstGeom prst="rect">
             <a:avLst/>
           </a:prstGeom>
-        </p:spPr>
-      </p:pic>
-      <p:pic>
-        <p:nvPicPr>
-          <p:cNvPr id="9" name="Kép 8"/>
-          <p:cNvPicPr>
-            <a:picLocks noChangeAspect="1"/>
-          </p:cNvPicPr>
+          <a:noFill/>
+        </p:spPr>
+        <p:txBody>
+          <a:bodyPr wrap="square" rtlCol="0">
+            <a:spAutoFit/>
+          </a:bodyPr>
+          <a:lstStyle/>
+          <a:p>
+            <a:r>
+              <a:rPr lang="en-US" sz="1200" smtClean="0"/>
+              <a:t>Rel. Time</a:t>
+            </a:r>
+            <a:endParaRPr lang="en-US" sz="1200"/>
+          </a:p>
+        </p:txBody>
+      </p:sp>
+      <p:cxnSp>
+        <p:nvCxnSpPr>
+          <p:cNvPr id="44" name="Egyenes összekötő nyíllal 43"/>
+          <p:cNvCxnSpPr/>
           <p:nvPr/>
-        </p:nvPicPr>
-        <p:blipFill>
-          <a:blip r:embed="rId5"/>
-          <a:stretch>
-            <a:fillRect/>
-          </a:stretch>
-        </p:blipFill>
+        </p:nvCxnSpPr>
         <p:spPr>
           <a:xfrm>
-            <a:off x="140676" y="2936503"/>
-            <a:ext cx="7194331" cy="909356"/>
+            <a:off x="1192695" y="4373362"/>
+            <a:ext cx="286946" cy="6887"/>
+          </a:xfrm>
+          <a:prstGeom prst="straightConnector1">
+            <a:avLst/>
+          </a:prstGeom>
+          <a:ln w="19050">
+            <a:solidFill>
+              <a:schemeClr val="tx1"/>
+            </a:solidFill>
+            <a:tailEnd type="triangle"/>
+          </a:ln>
+        </p:spPr>
+        <p:style>
+          <a:lnRef idx="1">
+            <a:schemeClr val="accent1"/>
+          </a:lnRef>
+          <a:fillRef idx="0">
+            <a:schemeClr val="accent1"/>
+          </a:fillRef>
+          <a:effectRef idx="0">
+            <a:schemeClr val="accent1"/>
+          </a:effectRef>
+          <a:fontRef idx="minor">
+            <a:schemeClr val="tx1"/>
+          </a:fontRef>
+        </p:style>
+      </p:cxnSp>
+      <p:sp>
+        <p:nvSpPr>
+          <p:cNvPr id="46" name="Szövegdoboz 45"/>
+          <p:cNvSpPr txBox="1"/>
+          <p:nvPr/>
+        </p:nvSpPr>
+        <p:spPr>
+          <a:xfrm rot="16200000">
+            <a:off x="331779" y="3577968"/>
+            <a:ext cx="1167122" cy="276999"/>
           </a:xfrm>
           <a:prstGeom prst="rect">
             <a:avLst/>
           </a:prstGeom>
-        </p:spPr>
-      </p:pic>
-      <p:pic>
-        <p:nvPicPr>
-          <p:cNvPr id="10" name="Kép 9"/>
-          <p:cNvPicPr>
-            <a:picLocks noChangeAspect="1"/>
-          </p:cNvPicPr>
+          <a:noFill/>
+        </p:spPr>
+        <p:txBody>
+          <a:bodyPr wrap="square" rtlCol="0">
+            <a:spAutoFit/>
+          </a:bodyPr>
+          <a:lstStyle/>
+          <a:p>
+            <a:r>
+              <a:rPr lang="en-US" sz="1200" smtClean="0"/>
+              <a:t>Start Time</a:t>
+            </a:r>
+            <a:endParaRPr lang="en-US" sz="1200"/>
+          </a:p>
+        </p:txBody>
+      </p:sp>
+      <p:cxnSp>
+        <p:nvCxnSpPr>
+          <p:cNvPr id="47" name="Egyenes összekötő nyíllal 46"/>
+          <p:cNvCxnSpPr/>
           <p:nvPr/>
-        </p:nvPicPr>
-        <p:blipFill>
-          <a:blip r:embed="rId6"/>
-          <a:stretch>
-            <a:fillRect/>
-          </a:stretch>
-        </p:blipFill>
+        </p:nvCxnSpPr>
         <p:spPr>
-          <a:xfrm>
-            <a:off x="140676" y="5023372"/>
-            <a:ext cx="8946801" cy="1564666"/>
+          <a:xfrm flipV="1">
+            <a:off x="1068630" y="3454666"/>
+            <a:ext cx="1622" cy="789200"/>
+          </a:xfrm>
+          <a:prstGeom prst="straightConnector1">
+            <a:avLst/>
+          </a:prstGeom>
+          <a:ln w="19050">
+            <a:solidFill>
+              <a:schemeClr val="tx1"/>
+            </a:solidFill>
+            <a:tailEnd type="triangle"/>
+          </a:ln>
+        </p:spPr>
+        <p:style>
+          <a:lnRef idx="1">
+            <a:schemeClr val="accent1"/>
+          </a:lnRef>
+          <a:fillRef idx="0">
+            <a:schemeClr val="accent1"/>
+          </a:fillRef>
+          <a:effectRef idx="0">
+            <a:schemeClr val="accent1"/>
+          </a:effectRef>
+          <a:fontRef idx="minor">
+            <a:schemeClr val="tx1"/>
+          </a:fontRef>
+        </p:style>
+      </p:cxnSp>
+      <p:sp>
+        <p:nvSpPr>
+          <p:cNvPr id="50" name="Szövegdoboz 49"/>
+          <p:cNvSpPr txBox="1"/>
+          <p:nvPr/>
+        </p:nvSpPr>
+        <p:spPr>
+          <a:xfrm>
+            <a:off x="78115" y="5673625"/>
+            <a:ext cx="9044049" cy="646331"/>
           </a:xfrm>
           <a:prstGeom prst="rect">
             <a:avLst/>
           </a:prstGeom>
-        </p:spPr>
-      </p:pic>
+          <a:noFill/>
+        </p:spPr>
+        <p:txBody>
+          <a:bodyPr wrap="square" rtlCol="0">
+            <a:spAutoFit/>
+          </a:bodyPr>
+          <a:lstStyle/>
+          <a:p>
+            <a:r>
+              <a:rPr lang="hu-HU" smtClean="0">
+                <a:latin typeface="+mj-lt"/>
+              </a:rPr>
+              <a:t>Doing </a:t>
+            </a:r>
+            <a:r>
+              <a:rPr lang="en-US" smtClean="0">
+                <a:latin typeface="+mj-lt"/>
+              </a:rPr>
+              <a:t>‘</a:t>
+            </a:r>
+            <a:r>
+              <a:rPr lang="hu-HU" smtClean="0">
+                <a:latin typeface="+mj-lt"/>
+              </a:rPr>
+              <a:t>mean</a:t>
+            </a:r>
+            <a:r>
+              <a:rPr lang="en-US" smtClean="0">
+                <a:latin typeface="+mj-lt"/>
+              </a:rPr>
+              <a:t>’ along Start Time </a:t>
+            </a:r>
+            <a:r>
+              <a:rPr lang="en-US" smtClean="0">
+                <a:latin typeface="+mj-lt"/>
+                <a:sym typeface="Wingdings" panose="05000000000000000000" pitchFamily="2" charset="2"/>
+              </a:rPr>
+              <a:t> average time evolution in intervals </a:t>
+            </a:r>
+            <a:endParaRPr lang="en-US">
+              <a:latin typeface="+mj-lt"/>
+              <a:sym typeface="Wingdings" panose="05000000000000000000" pitchFamily="2" charset="2"/>
+            </a:endParaRPr>
+          </a:p>
+          <a:p>
+            <a:r>
+              <a:rPr lang="en-US" smtClean="0">
+                <a:latin typeface="+mj-lt"/>
+                <a:sym typeface="Wingdings" panose="05000000000000000000" pitchFamily="2" charset="2"/>
+              </a:rPr>
+              <a:t>Doing ‘mean’ along Rel. Time  mean signal in intervals</a:t>
+            </a:r>
+          </a:p>
+        </p:txBody>
+      </p:sp>
     </p:spTree>
     <p:extLst>
       <p:ext uri="{BB962C8B-B14F-4D97-AF65-F5344CB8AC3E}">
@@ -6587,7 +8087,7 @@
                 <a:ea typeface="Arial Unicode MS" pitchFamily="34" charset="-128"/>
                 <a:cs typeface="Arial Unicode MS" pitchFamily="34" charset="-128"/>
               </a:rPr>
-              <a:t>Summing</a:t>
+              <a:t>Summing through intervals</a:t>
             </a:r>
             <a:endParaRPr lang="en-US" sz="2000" dirty="0">
               <a:solidFill>
@@ -6802,7 +8302,7 @@
                 <a:ea typeface="Arial Unicode MS" pitchFamily="34" charset="-128"/>
                 <a:cs typeface="Arial Unicode MS" pitchFamily="34" charset="-128"/>
               </a:rPr>
-              <a:t>Summing</a:t>
+              <a:t>Summing in intervals</a:t>
             </a:r>
             <a:endParaRPr lang="en-US" sz="2000" dirty="0">
               <a:solidFill>
@@ -6944,8 +8444,8 @@
         </p:blipFill>
         <p:spPr>
           <a:xfrm>
-            <a:off x="6668965" y="1797071"/>
-            <a:ext cx="1841989" cy="4702685"/>
+            <a:off x="6150221" y="1797071"/>
+            <a:ext cx="2360734" cy="4702685"/>
           </a:xfrm>
           <a:prstGeom prst="rect">
             <a:avLst/>
@@ -7091,7 +8591,7 @@
         <p:spPr>
           <a:xfrm>
             <a:off x="175313" y="565661"/>
-            <a:ext cx="9044049" cy="5909310"/>
+            <a:ext cx="9044049" cy="5696431"/>
           </a:xfrm>
           <a:prstGeom prst="rect">
             <a:avLst/>
@@ -7104,6 +8604,11 @@
           </a:bodyPr>
           <a:lstStyle/>
           <a:p>
+            <a:pPr>
+              <a:lnSpc>
+                <a:spcPts val="1900"/>
+              </a:lnSpc>
+            </a:pPr>
             <a:r>
               <a:rPr lang="en-US" smtClean="0">
                 <a:latin typeface="+mj-lt"/>
@@ -7113,6 +8618,11 @@
             </a:r>
           </a:p>
           <a:p>
+            <a:pPr>
+              <a:lnSpc>
+                <a:spcPts val="1900"/>
+              </a:lnSpc>
+            </a:pPr>
             <a:r>
               <a:rPr lang="en-US" smtClean="0">
                 <a:latin typeface="+mj-lt"/>
@@ -7122,12 +8632,22 @@
             </a:r>
           </a:p>
           <a:p>
+            <a:pPr>
+              <a:lnSpc>
+                <a:spcPts val="1900"/>
+              </a:lnSpc>
+            </a:pPr>
             <a:endParaRPr lang="en-US">
               <a:latin typeface="+mj-lt"/>
               <a:sym typeface="Wingdings" panose="05000000000000000000" pitchFamily="2" charset="2"/>
             </a:endParaRPr>
           </a:p>
           <a:p>
+            <a:pPr>
+              <a:lnSpc>
+                <a:spcPts val="1900"/>
+              </a:lnSpc>
+            </a:pPr>
             <a:r>
               <a:rPr lang="en-US" smtClean="0">
                 <a:solidFill>
@@ -7143,61 +8663,128 @@
                 <a:latin typeface="+mj-lt"/>
                 <a:sym typeface="Wingdings" panose="05000000000000000000" pitchFamily="2" charset="2"/>
               </a:rPr>
-              <a:t>Various scipy filters can be used along one coordinate</a:t>
-            </a:r>
-          </a:p>
-          <a:p>
+              <a:t>Various scipy filters can be used along one </a:t>
+            </a:r>
+            <a:r>
+              <a:rPr lang="en-US" smtClean="0">
+                <a:latin typeface="+mj-lt"/>
+                <a:sym typeface="Wingdings" panose="05000000000000000000" pitchFamily="2" charset="2"/>
+              </a:rPr>
+              <a:t>coordinate</a:t>
+            </a:r>
+          </a:p>
+          <a:p>
+            <a:pPr>
+              <a:lnSpc>
+                <a:spcPts val="1900"/>
+              </a:lnSpc>
+            </a:pPr>
+            <a:endParaRPr lang="en-US">
+              <a:latin typeface="+mj-lt"/>
+              <a:sym typeface="Wingdings" panose="05000000000000000000" pitchFamily="2" charset="2"/>
+            </a:endParaRPr>
+          </a:p>
+          <a:p>
+            <a:pPr>
+              <a:lnSpc>
+                <a:spcPts val="1900"/>
+              </a:lnSpc>
+            </a:pPr>
+            <a:r>
+              <a:rPr lang="en-US" smtClean="0">
+                <a:solidFill>
+                  <a:srgbClr val="3333FF"/>
+                </a:solidFill>
+                <a:latin typeface="+mj-lt"/>
+                <a:sym typeface="Wingdings" panose="05000000000000000000" pitchFamily="2" charset="2"/>
+              </a:rPr>
+              <a:t>detrend:</a:t>
+            </a:r>
+            <a:r>
+              <a:rPr lang="en-US" smtClean="0">
+                <a:latin typeface="+mj-lt"/>
+                <a:sym typeface="Wingdings" panose="05000000000000000000" pitchFamily="2" charset="2"/>
+              </a:rPr>
+              <a:t> Remove trend with polyfit. </a:t>
+            </a:r>
             <a:endParaRPr lang="en-US" smtClean="0">
               <a:latin typeface="+mj-lt"/>
               <a:sym typeface="Wingdings" panose="05000000000000000000" pitchFamily="2" charset="2"/>
             </a:endParaRPr>
           </a:p>
           <a:p>
-            <a:r>
-              <a:rPr lang="en-US" smtClean="0">
-                <a:solidFill>
-                  <a:srgbClr val="3333FF"/>
-                </a:solidFill>
-                <a:latin typeface="+mj-lt"/>
-                <a:sym typeface="Wingdings" panose="05000000000000000000" pitchFamily="2" charset="2"/>
-              </a:rPr>
-              <a:t>apsd:</a:t>
-            </a:r>
-            <a:r>
-              <a:rPr lang="en-US" smtClean="0">
-                <a:latin typeface="+mj-lt"/>
-                <a:sym typeface="Wingdings" panose="05000000000000000000" pitchFamily="2" charset="2"/>
-              </a:rPr>
-              <a:t> Auto Power Spectral Density along a coordinate</a:t>
-            </a:r>
-          </a:p>
-          <a:p>
-            <a:r>
-              <a:rPr lang="en-US">
-                <a:latin typeface="+mj-lt"/>
-                <a:sym typeface="Wingdings" panose="05000000000000000000" pitchFamily="2" charset="2"/>
-              </a:rPr>
-              <a:t> </a:t>
-            </a:r>
-            <a:r>
-              <a:rPr lang="en-US" smtClean="0">
-                <a:latin typeface="+mj-lt"/>
-                <a:sym typeface="Wingdings" panose="05000000000000000000" pitchFamily="2" charset="2"/>
-              </a:rPr>
-              <a:t>        (e.g. converts Time coordinate to Frequency)</a:t>
-            </a:r>
+            <a:pPr>
+              <a:lnSpc>
+                <a:spcPts val="1900"/>
+              </a:lnSpc>
+            </a:pPr>
             <a:endParaRPr lang="en-US" smtClean="0">
               <a:latin typeface="+mj-lt"/>
               <a:sym typeface="Wingdings" panose="05000000000000000000" pitchFamily="2" charset="2"/>
             </a:endParaRPr>
           </a:p>
           <a:p>
+            <a:pPr>
+              <a:lnSpc>
+                <a:spcPts val="1900"/>
+              </a:lnSpc>
+            </a:pPr>
+            <a:r>
+              <a:rPr lang="en-US" smtClean="0">
+                <a:solidFill>
+                  <a:srgbClr val="3333FF"/>
+                </a:solidFill>
+                <a:latin typeface="+mj-lt"/>
+                <a:sym typeface="Wingdings" panose="05000000000000000000" pitchFamily="2" charset="2"/>
+              </a:rPr>
+              <a:t>apsd:</a:t>
+            </a:r>
+            <a:r>
+              <a:rPr lang="en-US" smtClean="0">
+                <a:latin typeface="+mj-lt"/>
+                <a:sym typeface="Wingdings" panose="05000000000000000000" pitchFamily="2" charset="2"/>
+              </a:rPr>
+              <a:t> Auto Power Spectral Density along a coordinate</a:t>
+            </a:r>
+          </a:p>
+          <a:p>
+            <a:pPr>
+              <a:lnSpc>
+                <a:spcPts val="1900"/>
+              </a:lnSpc>
+            </a:pPr>
+            <a:r>
+              <a:rPr lang="en-US">
+                <a:latin typeface="+mj-lt"/>
+                <a:sym typeface="Wingdings" panose="05000000000000000000" pitchFamily="2" charset="2"/>
+              </a:rPr>
+              <a:t> </a:t>
+            </a:r>
+            <a:r>
+              <a:rPr lang="en-US" smtClean="0">
+                <a:latin typeface="+mj-lt"/>
+                <a:sym typeface="Wingdings" panose="05000000000000000000" pitchFamily="2" charset="2"/>
+              </a:rPr>
+              <a:t>        (e.g. converts Time coordinate to Frequency)</a:t>
+            </a:r>
+          </a:p>
+          <a:p>
+            <a:pPr>
+              <a:lnSpc>
+                <a:spcPts val="1900"/>
+              </a:lnSpc>
+            </a:pPr>
             <a:endParaRPr lang="en-US" smtClean="0">
               <a:latin typeface="+mj-lt"/>
               <a:sym typeface="Wingdings" panose="05000000000000000000" pitchFamily="2" charset="2"/>
             </a:endParaRPr>
           </a:p>
           <a:p>
+            <a:pPr>
+              <a:lnSpc>
+                <a:spcPts val="1900"/>
+              </a:lnSpc>
+            </a:pPr>
             <a:r>
               <a:rPr lang="en-US" smtClean="0">
                 <a:solidFill>
@@ -7217,6 +8804,11 @@
             </a:r>
           </a:p>
           <a:p>
+            <a:pPr>
+              <a:lnSpc>
+                <a:spcPts val="1900"/>
+              </a:lnSpc>
+            </a:pPr>
             <a:r>
               <a:rPr lang="en-US">
                 <a:latin typeface="+mj-lt"/>
@@ -7235,13 +8827,7 @@
               <a:rPr lang="en-US">
                 <a:sym typeface="Wingdings" panose="05000000000000000000" pitchFamily="2" charset="2"/>
               </a:rPr>
-              <a:t>(e.g. converts Time coordinate to </a:t>
-            </a:r>
-            <a:r>
-              <a:rPr lang="en-US">
-                <a:sym typeface="Wingdings" panose="05000000000000000000" pitchFamily="2" charset="2"/>
-              </a:rPr>
-              <a:t>Frequency</a:t>
+              <a:t>(e.g. converts Time coordinate to Frequency</a:t>
             </a:r>
             <a:r>
               <a:rPr lang="en-US" smtClean="0">
@@ -7255,12 +8841,22 @@
             </a:endParaRPr>
           </a:p>
           <a:p>
+            <a:pPr>
+              <a:lnSpc>
+                <a:spcPts val="1900"/>
+              </a:lnSpc>
+            </a:pPr>
             <a:endParaRPr lang="en-US" smtClean="0">
               <a:latin typeface="+mj-lt"/>
               <a:sym typeface="Wingdings" panose="05000000000000000000" pitchFamily="2" charset="2"/>
             </a:endParaRPr>
           </a:p>
           <a:p>
+            <a:pPr>
+              <a:lnSpc>
+                <a:spcPts val="1900"/>
+              </a:lnSpc>
+            </a:pPr>
             <a:r>
               <a:rPr lang="en-US" smtClean="0">
                 <a:solidFill>
@@ -7280,6 +8876,11 @@
             </a:r>
           </a:p>
           <a:p>
+            <a:pPr>
+              <a:lnSpc>
+                <a:spcPts val="1900"/>
+              </a:lnSpc>
+            </a:pPr>
             <a:r>
               <a:rPr lang="en-US">
                 <a:latin typeface="+mj-lt"/>
@@ -7296,6 +8897,11 @@
             </a:r>
           </a:p>
           <a:p>
+            <a:pPr>
+              <a:lnSpc>
+                <a:spcPts val="1900"/>
+              </a:lnSpc>
+            </a:pPr>
             <a:r>
               <a:rPr lang="en-US">
                 <a:latin typeface="+mj-lt"/>
@@ -7314,13 +8920,7 @@
               <a:rPr lang="en-US">
                 <a:sym typeface="Wingdings" panose="05000000000000000000" pitchFamily="2" charset="2"/>
               </a:rPr>
-              <a:t>(e.g. converts Time coordinate </a:t>
-            </a:r>
-            <a:r>
-              <a:rPr lang="en-US">
-                <a:sym typeface="Wingdings" panose="05000000000000000000" pitchFamily="2" charset="2"/>
-              </a:rPr>
-              <a:t>to </a:t>
+              <a:t>(e.g. converts Time coordinate to </a:t>
             </a:r>
             <a:r>
               <a:rPr lang="en-US" smtClean="0">
@@ -7334,12 +8934,22 @@
             </a:endParaRPr>
           </a:p>
           <a:p>
+            <a:pPr>
+              <a:lnSpc>
+                <a:spcPts val="1900"/>
+              </a:lnSpc>
+            </a:pPr>
             <a:endParaRPr lang="en-US" smtClean="0">
               <a:latin typeface="+mj-lt"/>
               <a:sym typeface="Wingdings" panose="05000000000000000000" pitchFamily="2" charset="2"/>
             </a:endParaRPr>
           </a:p>
           <a:p>
+            <a:pPr>
+              <a:lnSpc>
+                <a:spcPts val="1900"/>
+              </a:lnSpc>
+            </a:pPr>
             <a:r>
               <a:rPr lang="en-US" smtClean="0">
                 <a:solidFill>
@@ -7359,6 +8969,11 @@
             </a:r>
           </a:p>
           <a:p>
+            <a:pPr>
+              <a:lnSpc>
+                <a:spcPts val="1900"/>
+              </a:lnSpc>
+            </a:pPr>
             <a:r>
               <a:rPr lang="en-US">
                 <a:latin typeface="+mj-lt"/>
@@ -7375,6 +8990,11 @@
             </a:r>
           </a:p>
           <a:p>
+            <a:pPr>
+              <a:lnSpc>
+                <a:spcPts val="1900"/>
+              </a:lnSpc>
+            </a:pPr>
             <a:r>
               <a:rPr lang="en-US">
                 <a:latin typeface="+mj-lt"/>
@@ -7389,17 +9009,23 @@
               </a:rPr>
               <a:t>       The output data object can be used in slice_data  conditional averaging</a:t>
             </a:r>
-            <a:endParaRPr lang="en-US" smtClean="0">
-              <a:latin typeface="+mj-lt"/>
-              <a:sym typeface="Wingdings" panose="05000000000000000000" pitchFamily="2" charset="2"/>
-            </a:endParaRPr>
-          </a:p>
-          <a:p>
+          </a:p>
+          <a:p>
+            <a:pPr>
+              <a:lnSpc>
+                <a:spcPts val="1900"/>
+              </a:lnSpc>
+            </a:pPr>
             <a:endParaRPr lang="en-US" smtClean="0">
               <a:latin typeface="+mj-lt"/>
             </a:endParaRPr>
           </a:p>
           <a:p>
+            <a:pPr>
+              <a:lnSpc>
+                <a:spcPts val="1900"/>
+              </a:lnSpc>
+            </a:pPr>
             <a:r>
               <a:rPr lang="en-US" smtClean="0">
                 <a:solidFill>
@@ -7417,6 +9043,11 @@
             </a:r>
           </a:p>
           <a:p>
+            <a:pPr>
+              <a:lnSpc>
+                <a:spcPts val="1900"/>
+              </a:lnSpc>
+            </a:pPr>
             <a:r>
               <a:rPr lang="en-US">
                 <a:latin typeface="+mj-lt"/>
@@ -7427,17 +9058,8 @@
               <a:rPr lang="en-US" smtClean="0">
                 <a:latin typeface="+mj-lt"/>
               </a:rPr>
-              <a:t>                 broadcasting to be implemented soon</a:t>
-            </a:r>
-            <a:r>
-              <a:rPr lang="en-US" smtClean="0">
-                <a:latin typeface="+mj-lt"/>
-              </a:rPr>
-              <a:t> </a:t>
-            </a:r>
-            <a:endParaRPr lang="en-US" smtClean="0">
-              <a:latin typeface="+mj-lt"/>
-            </a:endParaRPr>
+              <a:t>                 broadcasting to be implemented soon </a:t>
+            </a:r>
           </a:p>
         </p:txBody>
       </p:sp>
@@ -7721,9 +9343,6 @@
               </a:rPr>
               <a:t>Default plots: e.g. 3D data object plotted as anim-... </a:t>
             </a:r>
-            <a:endParaRPr lang="en-US" smtClean="0">
-              <a:latin typeface="+mj-lt"/>
-            </a:endParaRPr>
           </a:p>
           <a:p>
             <a:pPr marL="285750" indent="-285750">
@@ -7754,9 +9373,6 @@
               </a:rPr>
               <a:t>Plot ID is returned: possible to overplot to any existing (even multi-part) plot.</a:t>
             </a:r>
-            <a:endParaRPr lang="en-US" smtClean="0">
-              <a:latin typeface="+mj-lt"/>
-            </a:endParaRPr>
           </a:p>
         </p:txBody>
       </p:sp>
@@ -7764,6 +9380,1090 @@
     <p:extLst>
       <p:ext uri="{BB962C8B-B14F-4D97-AF65-F5344CB8AC3E}">
         <p14:creationId xmlns:p14="http://schemas.microsoft.com/office/powerpoint/2010/main" val="2048413466"/>
+      </p:ext>
+    </p:extLst>
+  </p:cSld>
+  <p:clrMapOvr>
+    <a:masterClrMapping/>
+  </p:clrMapOvr>
+  <p:timing>
+    <p:tnLst>
+      <p:par>
+        <p:cTn id="1" dur="indefinite" restart="never" nodeType="tmRoot"/>
+      </p:par>
+    </p:tnLst>
+  </p:timing>
+</p:sld>
+</file>
+
+<file path=ppt/slides/slide16.xml><?xml version="1.0" encoding="utf-8"?>
+<p:sld xmlns:a="http://schemas.openxmlformats.org/drawingml/2006/main" xmlns:r="http://schemas.openxmlformats.org/officeDocument/2006/relationships" xmlns:p="http://schemas.openxmlformats.org/presentationml/2006/main">
+  <p:cSld>
+    <p:spTree>
+      <p:nvGrpSpPr>
+        <p:cNvPr id="1" name=""/>
+        <p:cNvGrpSpPr/>
+        <p:nvPr/>
+      </p:nvGrpSpPr>
+      <p:grpSpPr>
+        <a:xfrm>
+          <a:off x="0" y="0"/>
+          <a:ext cx="0" cy="0"/>
+          <a:chOff x="0" y="0"/>
+          <a:chExt cx="0" cy="0"/>
+        </a:xfrm>
+      </p:grpSpPr>
+      <p:sp>
+        <p:nvSpPr>
+          <p:cNvPr id="13" name="Téglalap 4"/>
+          <p:cNvSpPr/>
+          <p:nvPr/>
+        </p:nvSpPr>
+        <p:spPr bwMode="auto">
+          <a:xfrm>
+            <a:off x="1638311" y="59543"/>
+            <a:ext cx="5475514" cy="308179"/>
+          </a:xfrm>
+          <a:prstGeom prst="rect">
+            <a:avLst/>
+          </a:prstGeom>
+          <a:noFill/>
+          <a:ln>
+            <a:noFill/>
+          </a:ln>
+          <a:effectLst/>
+        </p:spPr>
+        <p:style>
+          <a:lnRef idx="2">
+            <a:schemeClr val="accent1">
+              <a:shade val="50000"/>
+            </a:schemeClr>
+          </a:lnRef>
+          <a:fillRef idx="1">
+            <a:schemeClr val="accent1"/>
+          </a:fillRef>
+          <a:effectRef idx="0">
+            <a:schemeClr val="accent1"/>
+          </a:effectRef>
+          <a:fontRef idx="minor">
+            <a:schemeClr val="lt1"/>
+          </a:fontRef>
+        </p:style>
+        <p:txBody>
+          <a:bodyPr anchor="ctr"/>
+          <a:lstStyle/>
+          <a:p>
+            <a:pPr algn="ctr">
+              <a:defRPr/>
+            </a:pPr>
+            <a:r>
+              <a:rPr lang="en-US" sz="2000" smtClean="0">
+                <a:solidFill>
+                  <a:schemeClr val="tx1"/>
+                </a:solidFill>
+                <a:ea typeface="Arial Unicode MS" pitchFamily="34" charset="-128"/>
+                <a:cs typeface="Arial Unicode MS" pitchFamily="34" charset="-128"/>
+              </a:rPr>
+              <a:t>Plotting</a:t>
+            </a:r>
+            <a:endParaRPr lang="en-US" sz="2000" dirty="0">
+              <a:solidFill>
+                <a:schemeClr val="tx1"/>
+              </a:solidFill>
+              <a:ea typeface="Arial Unicode MS" pitchFamily="34" charset="-128"/>
+              <a:cs typeface="Arial Unicode MS" pitchFamily="34" charset="-128"/>
+            </a:endParaRPr>
+          </a:p>
+        </p:txBody>
+      </p:sp>
+      <p:cxnSp>
+        <p:nvCxnSpPr>
+          <p:cNvPr id="8" name="Egyenes összekötő 7"/>
+          <p:cNvCxnSpPr/>
+          <p:nvPr/>
+        </p:nvCxnSpPr>
+        <p:spPr>
+          <a:xfrm>
+            <a:off x="1924526" y="1487329"/>
+            <a:ext cx="0" cy="0"/>
+          </a:xfrm>
+          <a:prstGeom prst="line">
+            <a:avLst/>
+          </a:prstGeom>
+        </p:spPr>
+        <p:style>
+          <a:lnRef idx="1">
+            <a:schemeClr val="accent1"/>
+          </a:lnRef>
+          <a:fillRef idx="0">
+            <a:schemeClr val="accent1"/>
+          </a:fillRef>
+          <a:effectRef idx="0">
+            <a:schemeClr val="accent1"/>
+          </a:effectRef>
+          <a:fontRef idx="minor">
+            <a:schemeClr val="tx1"/>
+          </a:fontRef>
+        </p:style>
+      </p:cxnSp>
+      <p:pic>
+        <p:nvPicPr>
+          <p:cNvPr id="4" name="Kép 3"/>
+          <p:cNvPicPr>
+            <a:picLocks noChangeAspect="1"/>
+          </p:cNvPicPr>
+          <p:nvPr/>
+        </p:nvPicPr>
+        <p:blipFill>
+          <a:blip r:embed="rId3"/>
+          <a:stretch>
+            <a:fillRect/>
+          </a:stretch>
+        </p:blipFill>
+        <p:spPr>
+          <a:xfrm>
+            <a:off x="-36760" y="1320811"/>
+            <a:ext cx="5341055" cy="3866623"/>
+          </a:xfrm>
+          <a:prstGeom prst="rect">
+            <a:avLst/>
+          </a:prstGeom>
+        </p:spPr>
+      </p:pic>
+      <p:sp>
+        <p:nvSpPr>
+          <p:cNvPr id="9" name="Szövegdoboz 8"/>
+          <p:cNvSpPr txBox="1"/>
+          <p:nvPr/>
+        </p:nvSpPr>
+        <p:spPr>
+          <a:xfrm>
+            <a:off x="5341055" y="951479"/>
+            <a:ext cx="2572482" cy="369332"/>
+          </a:xfrm>
+          <a:prstGeom prst="rect">
+            <a:avLst/>
+          </a:prstGeom>
+          <a:noFill/>
+        </p:spPr>
+        <p:txBody>
+          <a:bodyPr wrap="square" rtlCol="0">
+            <a:spAutoFit/>
+          </a:bodyPr>
+          <a:lstStyle/>
+          <a:p>
+            <a:r>
+              <a:rPr lang="en-US" smtClean="0">
+                <a:latin typeface="+mj-lt"/>
+              </a:rPr>
+              <a:t>‘multi-xy’ plot</a:t>
+            </a:r>
+            <a:endParaRPr lang="en-US" smtClean="0">
+              <a:latin typeface="+mj-lt"/>
+            </a:endParaRPr>
+          </a:p>
+        </p:txBody>
+      </p:sp>
+      <p:cxnSp>
+        <p:nvCxnSpPr>
+          <p:cNvPr id="7" name="Egyenes összekötő nyíllal 6"/>
+          <p:cNvCxnSpPr/>
+          <p:nvPr/>
+        </p:nvCxnSpPr>
+        <p:spPr>
+          <a:xfrm flipH="1">
+            <a:off x="4778774" y="1240643"/>
+            <a:ext cx="562281" cy="542207"/>
+          </a:xfrm>
+          <a:prstGeom prst="straightConnector1">
+            <a:avLst/>
+          </a:prstGeom>
+          <a:ln w="31750">
+            <a:solidFill>
+              <a:schemeClr val="tx1"/>
+            </a:solidFill>
+            <a:tailEnd type="triangle"/>
+          </a:ln>
+        </p:spPr>
+        <p:style>
+          <a:lnRef idx="1">
+            <a:schemeClr val="accent1"/>
+          </a:lnRef>
+          <a:fillRef idx="0">
+            <a:schemeClr val="accent1"/>
+          </a:fillRef>
+          <a:effectRef idx="0">
+            <a:schemeClr val="accent1"/>
+          </a:effectRef>
+          <a:fontRef idx="minor">
+            <a:schemeClr val="tx1"/>
+          </a:fontRef>
+        </p:style>
+      </p:cxnSp>
+      <p:sp>
+        <p:nvSpPr>
+          <p:cNvPr id="12" name="Szövegdoboz 11"/>
+          <p:cNvSpPr txBox="1"/>
+          <p:nvPr/>
+        </p:nvSpPr>
+        <p:spPr>
+          <a:xfrm>
+            <a:off x="269360" y="5583979"/>
+            <a:ext cx="2572482" cy="369332"/>
+          </a:xfrm>
+          <a:prstGeom prst="rect">
+            <a:avLst/>
+          </a:prstGeom>
+          <a:noFill/>
+        </p:spPr>
+        <p:txBody>
+          <a:bodyPr wrap="square" rtlCol="0">
+            <a:spAutoFit/>
+          </a:bodyPr>
+          <a:lstStyle/>
+          <a:p>
+            <a:r>
+              <a:rPr lang="en-US" smtClean="0">
+                <a:latin typeface="+mj-lt"/>
+              </a:rPr>
+              <a:t>‘xy’ plot</a:t>
+            </a:r>
+            <a:endParaRPr lang="en-US" smtClean="0">
+              <a:latin typeface="+mj-lt"/>
+            </a:endParaRPr>
+          </a:p>
+        </p:txBody>
+      </p:sp>
+      <p:cxnSp>
+        <p:nvCxnSpPr>
+          <p:cNvPr id="14" name="Egyenes összekötő nyíllal 13"/>
+          <p:cNvCxnSpPr/>
+          <p:nvPr/>
+        </p:nvCxnSpPr>
+        <p:spPr>
+          <a:xfrm flipV="1">
+            <a:off x="845475" y="4574654"/>
+            <a:ext cx="307864" cy="1096630"/>
+          </a:xfrm>
+          <a:prstGeom prst="straightConnector1">
+            <a:avLst/>
+          </a:prstGeom>
+          <a:ln w="31750">
+            <a:solidFill>
+              <a:schemeClr val="tx1"/>
+            </a:solidFill>
+            <a:tailEnd type="triangle"/>
+          </a:ln>
+        </p:spPr>
+        <p:style>
+          <a:lnRef idx="1">
+            <a:schemeClr val="accent1"/>
+          </a:lnRef>
+          <a:fillRef idx="0">
+            <a:schemeClr val="accent1"/>
+          </a:fillRef>
+          <a:effectRef idx="0">
+            <a:schemeClr val="accent1"/>
+          </a:effectRef>
+          <a:fontRef idx="minor">
+            <a:schemeClr val="tx1"/>
+          </a:fontRef>
+        </p:style>
+      </p:cxnSp>
+      <p:sp>
+        <p:nvSpPr>
+          <p:cNvPr id="15" name="Szövegdoboz 14"/>
+          <p:cNvSpPr txBox="1"/>
+          <p:nvPr/>
+        </p:nvSpPr>
+        <p:spPr>
+          <a:xfrm>
+            <a:off x="227552" y="517339"/>
+            <a:ext cx="2572482" cy="369332"/>
+          </a:xfrm>
+          <a:prstGeom prst="rect">
+            <a:avLst/>
+          </a:prstGeom>
+          <a:noFill/>
+        </p:spPr>
+        <p:txBody>
+          <a:bodyPr wrap="square" rtlCol="0">
+            <a:spAutoFit/>
+          </a:bodyPr>
+          <a:lstStyle/>
+          <a:p>
+            <a:r>
+              <a:rPr lang="en-US" smtClean="0">
+                <a:latin typeface="+mj-lt"/>
+              </a:rPr>
+              <a:t>‘image’ plot</a:t>
+            </a:r>
+            <a:endParaRPr lang="en-US" smtClean="0">
+              <a:latin typeface="+mj-lt"/>
+            </a:endParaRPr>
+          </a:p>
+        </p:txBody>
+      </p:sp>
+      <p:cxnSp>
+        <p:nvCxnSpPr>
+          <p:cNvPr id="17" name="Egyenes összekötő nyíllal 16"/>
+          <p:cNvCxnSpPr/>
+          <p:nvPr/>
+        </p:nvCxnSpPr>
+        <p:spPr>
+          <a:xfrm>
+            <a:off x="845475" y="836285"/>
+            <a:ext cx="569777" cy="831691"/>
+          </a:xfrm>
+          <a:prstGeom prst="straightConnector1">
+            <a:avLst/>
+          </a:prstGeom>
+          <a:ln w="31750">
+            <a:solidFill>
+              <a:schemeClr val="tx1"/>
+            </a:solidFill>
+            <a:tailEnd type="triangle"/>
+          </a:ln>
+        </p:spPr>
+        <p:style>
+          <a:lnRef idx="1">
+            <a:schemeClr val="accent1"/>
+          </a:lnRef>
+          <a:fillRef idx="0">
+            <a:schemeClr val="accent1"/>
+          </a:fillRef>
+          <a:effectRef idx="0">
+            <a:schemeClr val="accent1"/>
+          </a:effectRef>
+          <a:fontRef idx="minor">
+            <a:schemeClr val="tx1"/>
+          </a:fontRef>
+        </p:style>
+      </p:cxnSp>
+      <p:cxnSp>
+        <p:nvCxnSpPr>
+          <p:cNvPr id="20" name="Egyenes összekötő nyíllal 19"/>
+          <p:cNvCxnSpPr/>
+          <p:nvPr/>
+        </p:nvCxnSpPr>
+        <p:spPr>
+          <a:xfrm>
+            <a:off x="7269250" y="2476691"/>
+            <a:ext cx="284889" cy="739791"/>
+          </a:xfrm>
+          <a:prstGeom prst="straightConnector1">
+            <a:avLst/>
+          </a:prstGeom>
+          <a:ln w="31750">
+            <a:solidFill>
+              <a:schemeClr val="tx1"/>
+            </a:solidFill>
+            <a:tailEnd type="triangle"/>
+          </a:ln>
+        </p:spPr>
+        <p:style>
+          <a:lnRef idx="1">
+            <a:schemeClr val="accent1"/>
+          </a:lnRef>
+          <a:fillRef idx="0">
+            <a:schemeClr val="accent1"/>
+          </a:fillRef>
+          <a:effectRef idx="0">
+            <a:schemeClr val="accent1"/>
+          </a:effectRef>
+          <a:fontRef idx="minor">
+            <a:schemeClr val="tx1"/>
+          </a:fontRef>
+        </p:style>
+      </p:cxnSp>
+      <p:sp>
+        <p:nvSpPr>
+          <p:cNvPr id="21" name="Szövegdoboz 20"/>
+          <p:cNvSpPr txBox="1"/>
+          <p:nvPr/>
+        </p:nvSpPr>
+        <p:spPr>
+          <a:xfrm>
+            <a:off x="6091506" y="1843956"/>
+            <a:ext cx="2721656" cy="646331"/>
+          </a:xfrm>
+          <a:prstGeom prst="rect">
+            <a:avLst/>
+          </a:prstGeom>
+          <a:noFill/>
+        </p:spPr>
+        <p:txBody>
+          <a:bodyPr wrap="square" rtlCol="0">
+            <a:spAutoFit/>
+          </a:bodyPr>
+          <a:lstStyle/>
+          <a:p>
+            <a:r>
+              <a:rPr lang="en-US" smtClean="0">
+                <a:latin typeface="+mj-lt"/>
+              </a:rPr>
+              <a:t>‘xy’ plot from complex data</a:t>
+            </a:r>
+            <a:endParaRPr lang="en-US" smtClean="0">
+              <a:latin typeface="+mj-lt"/>
+            </a:endParaRPr>
+          </a:p>
+        </p:txBody>
+      </p:sp>
+      <p:pic>
+        <p:nvPicPr>
+          <p:cNvPr id="22" name="Kép 21"/>
+          <p:cNvPicPr>
+            <a:picLocks noChangeAspect="1"/>
+          </p:cNvPicPr>
+          <p:nvPr/>
+        </p:nvPicPr>
+        <p:blipFill rotWithShape="1">
+          <a:blip r:embed="rId4"/>
+          <a:srcRect l="1221"/>
+          <a:stretch/>
+        </p:blipFill>
+        <p:spPr>
+          <a:xfrm>
+            <a:off x="5270435" y="3120211"/>
+            <a:ext cx="3873565" cy="2632697"/>
+          </a:xfrm>
+          <a:prstGeom prst="rect">
+            <a:avLst/>
+          </a:prstGeom>
+        </p:spPr>
+      </p:pic>
+    </p:spTree>
+    <p:extLst>
+      <p:ext uri="{BB962C8B-B14F-4D97-AF65-F5344CB8AC3E}">
+        <p14:creationId xmlns:p14="http://schemas.microsoft.com/office/powerpoint/2010/main" val="1233618753"/>
+      </p:ext>
+    </p:extLst>
+  </p:cSld>
+  <p:clrMapOvr>
+    <a:masterClrMapping/>
+  </p:clrMapOvr>
+  <p:timing>
+    <p:tnLst>
+      <p:par>
+        <p:cTn id="1" dur="indefinite" restart="never" nodeType="tmRoot"/>
+      </p:par>
+    </p:tnLst>
+  </p:timing>
+</p:sld>
+</file>
+
+<file path=ppt/slides/slide17.xml><?xml version="1.0" encoding="utf-8"?>
+<p:sld xmlns:a="http://schemas.openxmlformats.org/drawingml/2006/main" xmlns:r="http://schemas.openxmlformats.org/officeDocument/2006/relationships" xmlns:p="http://schemas.openxmlformats.org/presentationml/2006/main">
+  <p:cSld>
+    <p:spTree>
+      <p:nvGrpSpPr>
+        <p:cNvPr id="1" name=""/>
+        <p:cNvGrpSpPr/>
+        <p:nvPr/>
+      </p:nvGrpSpPr>
+      <p:grpSpPr>
+        <a:xfrm>
+          <a:off x="0" y="0"/>
+          <a:ext cx="0" cy="0"/>
+          <a:chOff x="0" y="0"/>
+          <a:chExt cx="0" cy="0"/>
+        </a:xfrm>
+      </p:grpSpPr>
+      <p:sp>
+        <p:nvSpPr>
+          <p:cNvPr id="13" name="Téglalap 4"/>
+          <p:cNvSpPr/>
+          <p:nvPr/>
+        </p:nvSpPr>
+        <p:spPr bwMode="auto">
+          <a:xfrm>
+            <a:off x="1638311" y="59543"/>
+            <a:ext cx="5475514" cy="308179"/>
+          </a:xfrm>
+          <a:prstGeom prst="rect">
+            <a:avLst/>
+          </a:prstGeom>
+          <a:noFill/>
+          <a:ln>
+            <a:noFill/>
+          </a:ln>
+          <a:effectLst/>
+        </p:spPr>
+        <p:style>
+          <a:lnRef idx="2">
+            <a:schemeClr val="accent1">
+              <a:shade val="50000"/>
+            </a:schemeClr>
+          </a:lnRef>
+          <a:fillRef idx="1">
+            <a:schemeClr val="accent1"/>
+          </a:fillRef>
+          <a:effectRef idx="0">
+            <a:schemeClr val="accent1"/>
+          </a:effectRef>
+          <a:fontRef idx="minor">
+            <a:schemeClr val="lt1"/>
+          </a:fontRef>
+        </p:style>
+        <p:txBody>
+          <a:bodyPr anchor="ctr"/>
+          <a:lstStyle/>
+          <a:p>
+            <a:pPr algn="ctr">
+              <a:defRPr/>
+            </a:pPr>
+            <a:r>
+              <a:rPr lang="en-US" sz="2000" smtClean="0">
+                <a:solidFill>
+                  <a:schemeClr val="tx1"/>
+                </a:solidFill>
+                <a:ea typeface="Arial Unicode MS" pitchFamily="34" charset="-128"/>
+                <a:cs typeface="Arial Unicode MS" pitchFamily="34" charset="-128"/>
+              </a:rPr>
+              <a:t>anim plots</a:t>
+            </a:r>
+            <a:endParaRPr lang="en-US" sz="2000" dirty="0">
+              <a:solidFill>
+                <a:schemeClr val="tx1"/>
+              </a:solidFill>
+              <a:ea typeface="Arial Unicode MS" pitchFamily="34" charset="-128"/>
+              <a:cs typeface="Arial Unicode MS" pitchFamily="34" charset="-128"/>
+            </a:endParaRPr>
+          </a:p>
+        </p:txBody>
+      </p:sp>
+      <p:cxnSp>
+        <p:nvCxnSpPr>
+          <p:cNvPr id="8" name="Egyenes összekötő 7"/>
+          <p:cNvCxnSpPr/>
+          <p:nvPr/>
+        </p:nvCxnSpPr>
+        <p:spPr>
+          <a:xfrm>
+            <a:off x="1924526" y="1487329"/>
+            <a:ext cx="0" cy="0"/>
+          </a:xfrm>
+          <a:prstGeom prst="line">
+            <a:avLst/>
+          </a:prstGeom>
+        </p:spPr>
+        <p:style>
+          <a:lnRef idx="1">
+            <a:schemeClr val="accent1"/>
+          </a:lnRef>
+          <a:fillRef idx="0">
+            <a:schemeClr val="accent1"/>
+          </a:fillRef>
+          <a:effectRef idx="0">
+            <a:schemeClr val="accent1"/>
+          </a:effectRef>
+          <a:fontRef idx="minor">
+            <a:schemeClr val="tx1"/>
+          </a:fontRef>
+        </p:style>
+      </p:cxnSp>
+      <p:pic>
+        <p:nvPicPr>
+          <p:cNvPr id="2" name="test_video">
+            <a:hlinkClick r:id="" action="ppaction://media"/>
+          </p:cNvPr>
+          <p:cNvPicPr>
+            <a:picLocks noChangeAspect="1"/>
+          </p:cNvPicPr>
+          <p:nvPr>
+            <a:videoFile r:link="rId2"/>
+            <p:extLst>
+              <p:ext uri="{DAA4B4D4-6D71-4841-9C94-3DE7FCFB9230}">
+                <p14:media xmlns:p14="http://schemas.microsoft.com/office/powerpoint/2010/main" r:embed="rId1"/>
+              </p:ext>
+            </p:extLst>
+          </p:nvPr>
+        </p:nvPicPr>
+        <p:blipFill>
+          <a:blip r:embed="rId5"/>
+          <a:stretch>
+            <a:fillRect/>
+          </a:stretch>
+        </p:blipFill>
+        <p:spPr>
+          <a:xfrm>
+            <a:off x="1822672" y="1596109"/>
+            <a:ext cx="5436005" cy="4009760"/>
+          </a:xfrm>
+          <a:prstGeom prst="rect">
+            <a:avLst/>
+          </a:prstGeom>
+        </p:spPr>
+      </p:pic>
+      <p:pic>
+        <p:nvPicPr>
+          <p:cNvPr id="3" name="Kép 2"/>
+          <p:cNvPicPr>
+            <a:picLocks noChangeAspect="1"/>
+          </p:cNvPicPr>
+          <p:nvPr/>
+        </p:nvPicPr>
+        <p:blipFill>
+          <a:blip r:embed="rId6"/>
+          <a:stretch>
+            <a:fillRect/>
+          </a:stretch>
+        </p:blipFill>
+        <p:spPr>
+          <a:xfrm>
+            <a:off x="98994" y="1121360"/>
+            <a:ext cx="8970558" cy="322362"/>
+          </a:xfrm>
+          <a:prstGeom prst="rect">
+            <a:avLst/>
+          </a:prstGeom>
+        </p:spPr>
+      </p:pic>
+      <p:sp>
+        <p:nvSpPr>
+          <p:cNvPr id="9" name="Szövegdoboz 8"/>
+          <p:cNvSpPr txBox="1"/>
+          <p:nvPr/>
+        </p:nvSpPr>
+        <p:spPr>
+          <a:xfrm>
+            <a:off x="4697337" y="6108093"/>
+            <a:ext cx="4117096" cy="369332"/>
+          </a:xfrm>
+          <a:prstGeom prst="rect">
+            <a:avLst/>
+          </a:prstGeom>
+          <a:noFill/>
+        </p:spPr>
+        <p:txBody>
+          <a:bodyPr wrap="square" rtlCol="0">
+            <a:spAutoFit/>
+          </a:bodyPr>
+          <a:lstStyle/>
+          <a:p>
+            <a:r>
+              <a:rPr lang="en-US" smtClean="0">
+                <a:latin typeface="+mj-lt"/>
+              </a:rPr>
+              <a:t>‘anim-image’ plot of test video data</a:t>
+            </a:r>
+            <a:endParaRPr lang="en-US" smtClean="0">
+              <a:latin typeface="+mj-lt"/>
+            </a:endParaRPr>
+          </a:p>
+        </p:txBody>
+      </p:sp>
+      <p:sp>
+        <p:nvSpPr>
+          <p:cNvPr id="10" name="Szövegdoboz 9"/>
+          <p:cNvSpPr txBox="1"/>
+          <p:nvPr/>
+        </p:nvSpPr>
+        <p:spPr>
+          <a:xfrm>
+            <a:off x="175313" y="565661"/>
+            <a:ext cx="9044049" cy="369332"/>
+          </a:xfrm>
+          <a:prstGeom prst="rect">
+            <a:avLst/>
+          </a:prstGeom>
+          <a:noFill/>
+        </p:spPr>
+        <p:txBody>
+          <a:bodyPr wrap="square" rtlCol="0">
+            <a:spAutoFit/>
+          </a:bodyPr>
+          <a:lstStyle/>
+          <a:p>
+            <a:r>
+              <a:rPr lang="en-US" smtClean="0">
+                <a:latin typeface="+mj-lt"/>
+              </a:rPr>
+              <a:t>‘anim-image’, ‘anim-contour’ are 3D plots</a:t>
+            </a:r>
+            <a:endParaRPr lang="en-US" smtClean="0">
+              <a:latin typeface="+mj-lt"/>
+            </a:endParaRPr>
+          </a:p>
+        </p:txBody>
+      </p:sp>
+    </p:spTree>
+    <p:extLst>
+      <p:ext uri="{BB962C8B-B14F-4D97-AF65-F5344CB8AC3E}">
+        <p14:creationId xmlns:p14="http://schemas.microsoft.com/office/powerpoint/2010/main" val="3942154300"/>
+      </p:ext>
+    </p:extLst>
+  </p:cSld>
+  <p:clrMapOvr>
+    <a:masterClrMapping/>
+  </p:clrMapOvr>
+  <p:timing>
+    <p:tnLst>
+      <p:par>
+        <p:cTn id="1" dur="indefinite" restart="never" nodeType="tmRoot">
+          <p:childTnLst>
+            <p:seq concurrent="1" nextAc="seek">
+              <p:cTn id="2" restart="whenNotActive" fill="hold" evtFilter="cancelBubble" nodeType="interactiveSeq">
+                <p:stCondLst>
+                  <p:cond evt="onClick" delay="0">
+                    <p:tgtEl>
+                      <p:spTgt spid="2"/>
+                    </p:tgtEl>
+                  </p:cond>
+                </p:stCondLst>
+                <p:endSync evt="end" delay="0">
+                  <p:rtn val="all"/>
+                </p:endSync>
+                <p:childTnLst>
+                  <p:par>
+                    <p:cTn id="3" fill="hold">
+                      <p:stCondLst>
+                        <p:cond delay="0"/>
+                      </p:stCondLst>
+                      <p:childTnLst>
+                        <p:par>
+                          <p:cTn id="4" fill="hold">
+                            <p:stCondLst>
+                              <p:cond delay="0"/>
+                            </p:stCondLst>
+                            <p:childTnLst>
+                              <p:par>
+                                <p:cTn id="5" presetID="2" presetClass="mediacall" presetSubtype="0" fill="hold" nodeType="clickEffect">
+                                  <p:stCondLst>
+                                    <p:cond delay="0"/>
+                                  </p:stCondLst>
+                                  <p:childTnLst>
+                                    <p:cmd type="call" cmd="togglePause">
+                                      <p:cBhvr>
+                                        <p:cTn id="6" dur="1" fill="hold"/>
+                                        <p:tgtEl>
+                                          <p:spTgt spid="2"/>
+                                        </p:tgtEl>
+                                      </p:cBhvr>
+                                    </p:cmd>
+                                  </p:childTnLst>
+                                </p:cTn>
+                              </p:par>
+                            </p:childTnLst>
+                          </p:cTn>
+                        </p:par>
+                      </p:childTnLst>
+                    </p:cTn>
+                  </p:par>
+                </p:childTnLst>
+              </p:cTn>
+              <p:nextCondLst>
+                <p:cond evt="onClick" delay="0">
+                  <p:tgtEl>
+                    <p:spTgt spid="2"/>
+                  </p:tgtEl>
+                </p:cond>
+              </p:nextCondLst>
+            </p:seq>
+            <p:video>
+              <p:cMediaNode vol="80000">
+                <p:cTn id="7" fill="hold" display="0">
+                  <p:stCondLst>
+                    <p:cond delay="indefinite"/>
+                  </p:stCondLst>
+                </p:cTn>
+                <p:tgtEl>
+                  <p:spTgt spid="2"/>
+                </p:tgtEl>
+              </p:cMediaNode>
+            </p:video>
+          </p:childTnLst>
+        </p:cTn>
+      </p:par>
+    </p:tnLst>
+  </p:timing>
+</p:sld>
+</file>
+
+<file path=ppt/slides/slide18.xml><?xml version="1.0" encoding="utf-8"?>
+<p:sld xmlns:a="http://schemas.openxmlformats.org/drawingml/2006/main" xmlns:r="http://schemas.openxmlformats.org/officeDocument/2006/relationships" xmlns:p="http://schemas.openxmlformats.org/presentationml/2006/main">
+  <p:cSld>
+    <p:spTree>
+      <p:nvGrpSpPr>
+        <p:cNvPr id="1" name=""/>
+        <p:cNvGrpSpPr/>
+        <p:nvPr/>
+      </p:nvGrpSpPr>
+      <p:grpSpPr>
+        <a:xfrm>
+          <a:off x="0" y="0"/>
+          <a:ext cx="0" cy="0"/>
+          <a:chOff x="0" y="0"/>
+          <a:chExt cx="0" cy="0"/>
+        </a:xfrm>
+      </p:grpSpPr>
+      <p:sp>
+        <p:nvSpPr>
+          <p:cNvPr id="13" name="Téglalap 4"/>
+          <p:cNvSpPr/>
+          <p:nvPr/>
+        </p:nvSpPr>
+        <p:spPr bwMode="auto">
+          <a:xfrm>
+            <a:off x="1638311" y="59543"/>
+            <a:ext cx="5475514" cy="308179"/>
+          </a:xfrm>
+          <a:prstGeom prst="rect">
+            <a:avLst/>
+          </a:prstGeom>
+          <a:noFill/>
+          <a:ln>
+            <a:noFill/>
+          </a:ln>
+          <a:effectLst/>
+        </p:spPr>
+        <p:style>
+          <a:lnRef idx="2">
+            <a:schemeClr val="accent1">
+              <a:shade val="50000"/>
+            </a:schemeClr>
+          </a:lnRef>
+          <a:fillRef idx="1">
+            <a:schemeClr val="accent1"/>
+          </a:fillRef>
+          <a:effectRef idx="0">
+            <a:schemeClr val="accent1"/>
+          </a:effectRef>
+          <a:fontRef idx="minor">
+            <a:schemeClr val="lt1"/>
+          </a:fontRef>
+        </p:style>
+        <p:txBody>
+          <a:bodyPr anchor="ctr"/>
+          <a:lstStyle/>
+          <a:p>
+            <a:pPr algn="ctr">
+              <a:defRPr/>
+            </a:pPr>
+            <a:r>
+              <a:rPr lang="en-US" sz="2000" smtClean="0">
+                <a:solidFill>
+                  <a:schemeClr val="tx1"/>
+                </a:solidFill>
+                <a:ea typeface="Arial Unicode MS" pitchFamily="34" charset="-128"/>
+                <a:cs typeface="Arial Unicode MS" pitchFamily="34" charset="-128"/>
+              </a:rPr>
+              <a:t>Summary</a:t>
+            </a:r>
+            <a:endParaRPr lang="en-US" sz="2000" dirty="0">
+              <a:solidFill>
+                <a:schemeClr val="tx1"/>
+              </a:solidFill>
+              <a:ea typeface="Arial Unicode MS" pitchFamily="34" charset="-128"/>
+              <a:cs typeface="Arial Unicode MS" pitchFamily="34" charset="-128"/>
+            </a:endParaRPr>
+          </a:p>
+        </p:txBody>
+      </p:sp>
+      <p:cxnSp>
+        <p:nvCxnSpPr>
+          <p:cNvPr id="8" name="Egyenes összekötő 7"/>
+          <p:cNvCxnSpPr/>
+          <p:nvPr/>
+        </p:nvCxnSpPr>
+        <p:spPr>
+          <a:xfrm>
+            <a:off x="1924526" y="1487329"/>
+            <a:ext cx="0" cy="0"/>
+          </a:xfrm>
+          <a:prstGeom prst="line">
+            <a:avLst/>
+          </a:prstGeom>
+        </p:spPr>
+        <p:style>
+          <a:lnRef idx="1">
+            <a:schemeClr val="accent1"/>
+          </a:lnRef>
+          <a:fillRef idx="0">
+            <a:schemeClr val="accent1"/>
+          </a:fillRef>
+          <a:effectRef idx="0">
+            <a:schemeClr val="accent1"/>
+          </a:effectRef>
+          <a:fontRef idx="minor">
+            <a:schemeClr val="tx1"/>
+          </a:fontRef>
+        </p:style>
+      </p:cxnSp>
+      <p:sp>
+        <p:nvSpPr>
+          <p:cNvPr id="11" name="Szövegdoboz 10"/>
+          <p:cNvSpPr txBox="1"/>
+          <p:nvPr/>
+        </p:nvSpPr>
+        <p:spPr>
+          <a:xfrm>
+            <a:off x="172443" y="689303"/>
+            <a:ext cx="9044049" cy="3416320"/>
+          </a:xfrm>
+          <a:prstGeom prst="rect">
+            <a:avLst/>
+          </a:prstGeom>
+          <a:noFill/>
+        </p:spPr>
+        <p:txBody>
+          <a:bodyPr wrap="square" rtlCol="0">
+            <a:spAutoFit/>
+          </a:bodyPr>
+          <a:lstStyle/>
+          <a:p>
+            <a:pPr marL="285750" indent="-285750">
+              <a:lnSpc>
+                <a:spcPct val="150000"/>
+              </a:lnSpc>
+              <a:buFont typeface="Arial" panose="020B0604020202020204" pitchFamily="34" charset="0"/>
+              <a:buChar char="•"/>
+            </a:pPr>
+            <a:r>
+              <a:rPr lang="en-US" smtClean="0">
+                <a:latin typeface="+mj-lt"/>
+              </a:rPr>
+              <a:t>FLAP package has now good functionality</a:t>
+            </a:r>
+          </a:p>
+          <a:p>
+            <a:pPr marL="285750" indent="-285750">
+              <a:lnSpc>
+                <a:spcPct val="150000"/>
+              </a:lnSpc>
+              <a:buFont typeface="Arial" panose="020B0604020202020204" pitchFamily="34" charset="0"/>
+              <a:buChar char="•"/>
+            </a:pPr>
+            <a:r>
+              <a:rPr lang="en-US" smtClean="0">
+                <a:latin typeface="+mj-lt"/>
+                <a:sym typeface="Wingdings" panose="05000000000000000000" pitchFamily="2" charset="2"/>
+              </a:rPr>
+              <a:t>Considered as beta version</a:t>
+            </a:r>
+          </a:p>
+          <a:p>
+            <a:pPr marL="285750" indent="-285750">
+              <a:lnSpc>
+                <a:spcPct val="150000"/>
+              </a:lnSpc>
+              <a:buFont typeface="Arial" panose="020B0604020202020204" pitchFamily="34" charset="0"/>
+              <a:buChar char="•"/>
+            </a:pPr>
+            <a:r>
+              <a:rPr lang="en-US" smtClean="0">
+                <a:latin typeface="+mj-lt"/>
+                <a:sym typeface="Wingdings" panose="05000000000000000000" pitchFamily="2" charset="2"/>
+              </a:rPr>
+              <a:t>Available </a:t>
+            </a:r>
+            <a:r>
+              <a:rPr lang="en-US" smtClean="0">
+                <a:latin typeface="+mj-lt"/>
+                <a:sym typeface="Wingdings" panose="05000000000000000000" pitchFamily="2" charset="2"/>
+              </a:rPr>
+              <a:t>on GitHub: </a:t>
+            </a:r>
+            <a:r>
+              <a:rPr lang="en-US">
+                <a:hlinkClick r:id="rId3"/>
+              </a:rPr>
+              <a:t>https://</a:t>
+            </a:r>
+            <a:r>
+              <a:rPr lang="en-US" smtClean="0">
+                <a:hlinkClick r:id="rId3"/>
+              </a:rPr>
+              <a:t>github.com/fusion-flap</a:t>
+            </a:r>
+            <a:endParaRPr lang="en-US" smtClean="0"/>
+          </a:p>
+          <a:p>
+            <a:pPr marL="742950" lvl="1" indent="-285750">
+              <a:lnSpc>
+                <a:spcPct val="150000"/>
+              </a:lnSpc>
+              <a:buFont typeface="Arial" panose="020B0604020202020204" pitchFamily="34" charset="0"/>
+              <a:buChar char="•"/>
+            </a:pPr>
+            <a:r>
+              <a:rPr lang="en-US" smtClean="0">
+                <a:latin typeface="+mj-lt"/>
+                <a:sym typeface="Wingdings" panose="05000000000000000000" pitchFamily="2" charset="2"/>
+              </a:rPr>
+              <a:t>master branch is stable</a:t>
+            </a:r>
+          </a:p>
+          <a:p>
+            <a:pPr marL="742950" lvl="1" indent="-285750">
+              <a:lnSpc>
+                <a:spcPct val="150000"/>
+              </a:lnSpc>
+              <a:buFont typeface="Arial" panose="020B0604020202020204" pitchFamily="34" charset="0"/>
+              <a:buChar char="•"/>
+            </a:pPr>
+            <a:r>
+              <a:rPr lang="en-US" smtClean="0">
+                <a:latin typeface="+mj-lt"/>
+                <a:sym typeface="Wingdings" panose="05000000000000000000" pitchFamily="2" charset="2"/>
+              </a:rPr>
+              <a:t>development is current upgrades</a:t>
+            </a:r>
+          </a:p>
+          <a:p>
+            <a:pPr marL="742950" lvl="1" indent="-285750">
+              <a:lnSpc>
+                <a:spcPct val="150000"/>
+              </a:lnSpc>
+              <a:buFont typeface="Arial" panose="020B0604020202020204" pitchFamily="34" charset="0"/>
+              <a:buChar char="•"/>
+            </a:pPr>
+            <a:r>
+              <a:rPr lang="en-US" smtClean="0">
+                <a:latin typeface="+mj-lt"/>
+                <a:sym typeface="Wingdings" panose="05000000000000000000" pitchFamily="2" charset="2"/>
+              </a:rPr>
+              <a:t>flap_tests.py demonstrates possibilities on test data</a:t>
+            </a:r>
+          </a:p>
+          <a:p>
+            <a:pPr marL="285750" indent="-285750">
+              <a:lnSpc>
+                <a:spcPct val="150000"/>
+              </a:lnSpc>
+              <a:buFont typeface="Arial" panose="020B0604020202020204" pitchFamily="34" charset="0"/>
+              <a:buChar char="•"/>
+            </a:pPr>
+            <a:r>
+              <a:rPr lang="en-US" smtClean="0">
+                <a:latin typeface="+mj-lt"/>
+                <a:sym typeface="Wingdings" panose="05000000000000000000" pitchFamily="2" charset="2"/>
+              </a:rPr>
+              <a:t>Users, collaborators are welcome</a:t>
+            </a:r>
+            <a:endParaRPr lang="en-US" smtClean="0">
+              <a:latin typeface="+mj-lt"/>
+              <a:sym typeface="Wingdings" panose="05000000000000000000" pitchFamily="2" charset="2"/>
+            </a:endParaRPr>
+          </a:p>
+          <a:p>
+            <a:pPr>
+              <a:lnSpc>
+                <a:spcPct val="150000"/>
+              </a:lnSpc>
+            </a:pPr>
+            <a:endParaRPr lang="en-US" smtClean="0">
+              <a:latin typeface="+mj-lt"/>
+              <a:sym typeface="Wingdings" panose="05000000000000000000" pitchFamily="2" charset="2"/>
+            </a:endParaRPr>
+          </a:p>
+        </p:txBody>
+      </p:sp>
+    </p:spTree>
+    <p:extLst>
+      <p:ext uri="{BB962C8B-B14F-4D97-AF65-F5344CB8AC3E}">
+        <p14:creationId xmlns:p14="http://schemas.microsoft.com/office/powerpoint/2010/main" val="255634024"/>
       </p:ext>
     </p:extLst>
   </p:cSld>
@@ -7922,7 +10622,7 @@
                 <a:latin typeface="+mj-lt"/>
                 <a:sym typeface="Wingdings" panose="05000000000000000000" pitchFamily="2" charset="2"/>
               </a:rPr>
-              <a:t> flap.DataObject</a:t>
+              <a:t> processing  flap.DataObject</a:t>
             </a:r>
             <a:endParaRPr lang="en-US" smtClean="0">
               <a:latin typeface="+mj-lt"/>
@@ -10080,7 +12780,7 @@
                 </a:solidFill>
                 <a:latin typeface="+mj-lt"/>
               </a:rPr>
-              <a:t>Test video: 10x15 matrix of signals:</a:t>
+              <a:t>Test video: Sequence of 1024x1280 pixel images:</a:t>
             </a:r>
           </a:p>
           <a:p>
@@ -10765,7 +13465,19 @@
               <a:rPr lang="en-US" smtClean="0">
                 <a:latin typeface="+mj-lt"/>
               </a:rPr>
-              <a:t> MSD+ for W7-X. Can use signal translation table, e.g:</a:t>
+              <a:t> </a:t>
+            </a:r>
+            <a:r>
+              <a:rPr lang="en-US" smtClean="0">
+                <a:latin typeface="+mj-lt"/>
+              </a:rPr>
+              <a:t>MDS+ </a:t>
+            </a:r>
+            <a:r>
+              <a:rPr lang="en-US" smtClean="0">
+                <a:latin typeface="+mj-lt"/>
+              </a:rPr>
+              <a:t>for W7-X. Can use signal translation table, e.g:</a:t>
             </a:r>
           </a:p>
         </p:txBody>
@@ -10786,7 +13498,7 @@
         </p:blipFill>
         <p:spPr>
           <a:xfrm>
-            <a:off x="54767" y="2551871"/>
+            <a:off x="54767" y="2561061"/>
             <a:ext cx="8869163" cy="579844"/>
           </a:xfrm>
           <a:prstGeom prst="rect">

</xml_diff>